<commit_message>
adding better conclusion and better explanation of docker networking during the overview
</commit_message>
<xml_diff>
--- a/slides.pptx
+++ b/slides.pptx
@@ -5,31 +5,34 @@
     <p:sldMasterId id="2147483648" r:id="rId1"/>
   </p:sldMasterIdLst>
   <p:notesMasterIdLst>
-    <p:notesMasterId r:id="rId24"/>
+    <p:notesMasterId r:id="rId27"/>
   </p:notesMasterIdLst>
   <p:sldIdLst>
     <p:sldId id="256" r:id="rId2"/>
     <p:sldId id="257" r:id="rId3"/>
-    <p:sldId id="258" r:id="rId4"/>
-    <p:sldId id="259" r:id="rId5"/>
-    <p:sldId id="260" r:id="rId6"/>
-    <p:sldId id="261" r:id="rId7"/>
-    <p:sldId id="262" r:id="rId8"/>
-    <p:sldId id="263" r:id="rId9"/>
-    <p:sldId id="264" r:id="rId10"/>
-    <p:sldId id="265" r:id="rId11"/>
-    <p:sldId id="266" r:id="rId12"/>
-    <p:sldId id="267" r:id="rId13"/>
-    <p:sldId id="268" r:id="rId14"/>
-    <p:sldId id="269" r:id="rId15"/>
-    <p:sldId id="270" r:id="rId16"/>
-    <p:sldId id="271" r:id="rId17"/>
-    <p:sldId id="272" r:id="rId18"/>
-    <p:sldId id="273" r:id="rId19"/>
-    <p:sldId id="275" r:id="rId20"/>
-    <p:sldId id="276" r:id="rId21"/>
-    <p:sldId id="277" r:id="rId22"/>
-    <p:sldId id="278" r:id="rId23"/>
+    <p:sldId id="279" r:id="rId4"/>
+    <p:sldId id="258" r:id="rId5"/>
+    <p:sldId id="259" r:id="rId6"/>
+    <p:sldId id="260" r:id="rId7"/>
+    <p:sldId id="261" r:id="rId8"/>
+    <p:sldId id="262" r:id="rId9"/>
+    <p:sldId id="263" r:id="rId10"/>
+    <p:sldId id="264" r:id="rId11"/>
+    <p:sldId id="265" r:id="rId12"/>
+    <p:sldId id="281" r:id="rId13"/>
+    <p:sldId id="266" r:id="rId14"/>
+    <p:sldId id="267" r:id="rId15"/>
+    <p:sldId id="268" r:id="rId16"/>
+    <p:sldId id="269" r:id="rId17"/>
+    <p:sldId id="270" r:id="rId18"/>
+    <p:sldId id="271" r:id="rId19"/>
+    <p:sldId id="282" r:id="rId20"/>
+    <p:sldId id="272" r:id="rId21"/>
+    <p:sldId id="273" r:id="rId22"/>
+    <p:sldId id="275" r:id="rId23"/>
+    <p:sldId id="276" r:id="rId24"/>
+    <p:sldId id="280" r:id="rId25"/>
+    <p:sldId id="278" r:id="rId26"/>
   </p:sldIdLst>
   <p:sldSz cx="9144000" cy="6858000" type="screen4x3"/>
   <p:notesSz cx="6858000" cy="9144000"/>
@@ -642,7 +645,7 @@
           <a:p>
             <a:fld id="{899CA6E9-1B4A-5D4F-A404-1838757C76D1}" type="slidenum">
               <a:rPr lang="en-US" smtClean="0"/>
-              <a:t>17</a:t>
+              <a:t>20</a:t>
             </a:fld>
             <a:endParaRPr lang="en-US"/>
           </a:p>
@@ -707,7 +710,51 @@
           <a:p>
             <a:r>
               <a:rPr lang="en-US" dirty="0" smtClean="0"/>
-              <a:t>Need screenshot</a:t>
+              <a:t>Show sample at</a:t>
+            </a:r>
+            <a:r>
+              <a:rPr lang="en-US" baseline="0" dirty="0" smtClean="0"/>
+              <a:t> https://</a:t>
+            </a:r>
+            <a:r>
+              <a:rPr lang="en-US" baseline="0" dirty="0" err="1" smtClean="0"/>
+              <a:t>github.com</a:t>
+            </a:r>
+            <a:r>
+              <a:rPr lang="en-US" baseline="0" dirty="0" smtClean="0"/>
+              <a:t>/</a:t>
+            </a:r>
+            <a:r>
+              <a:rPr lang="en-US" baseline="0" dirty="0" err="1" smtClean="0"/>
+              <a:t>AndrewSwerlick</a:t>
+            </a:r>
+            <a:r>
+              <a:rPr lang="en-US" baseline="0" dirty="0" smtClean="0"/>
+              <a:t>/</a:t>
+            </a:r>
+            <a:r>
+              <a:rPr lang="en-US" baseline="0" dirty="0" err="1" smtClean="0"/>
+              <a:t>docker</a:t>
+            </a:r>
+            <a:r>
+              <a:rPr lang="en-US" baseline="0" dirty="0" smtClean="0"/>
+              <a:t>-talk/blob/master/roles/</a:t>
+            </a:r>
+            <a:r>
+              <a:rPr lang="en-US" baseline="0" dirty="0" err="1" smtClean="0"/>
+              <a:t>nginx</a:t>
+            </a:r>
+            <a:r>
+              <a:rPr lang="en-US" baseline="0" dirty="0" smtClean="0"/>
+              <a:t>-proxy/tasks/</a:t>
+            </a:r>
+            <a:r>
+              <a:rPr lang="en-US" baseline="0" dirty="0" err="1" smtClean="0"/>
+              <a:t>main.yml</a:t>
+            </a:r>
+            <a:r>
+              <a:rPr lang="en-US" baseline="0" dirty="0" smtClean="0"/>
+              <a:t> </a:t>
             </a:r>
             <a:endParaRPr lang="en-US" dirty="0"/>
           </a:p>
@@ -730,7 +777,7 @@
           <a:p>
             <a:fld id="{899CA6E9-1B4A-5D4F-A404-1838757C76D1}" type="slidenum">
               <a:rPr lang="en-US" smtClean="0"/>
-              <a:t>4</a:t>
+              <a:t>5</a:t>
             </a:fld>
             <a:endParaRPr lang="en-US"/>
           </a:p>
@@ -795,7 +842,7 @@
           <a:p>
             <a:r>
               <a:rPr lang="en-US" dirty="0" smtClean="0"/>
-              <a:t>Show screenshot and simplified example</a:t>
+              <a:t>Show sample project roles folder and playbook</a:t>
             </a:r>
             <a:endParaRPr lang="en-US" dirty="0"/>
           </a:p>
@@ -818,7 +865,7 @@
           <a:p>
             <a:fld id="{899CA6E9-1B4A-5D4F-A404-1838757C76D1}" type="slidenum">
               <a:rPr lang="en-US" smtClean="0"/>
-              <a:t>5</a:t>
+              <a:t>6</a:t>
             </a:fld>
             <a:endParaRPr lang="en-US"/>
           </a:p>
@@ -934,7 +981,7 @@
           <a:p>
             <a:fld id="{899CA6E9-1B4A-5D4F-A404-1838757C76D1}" type="slidenum">
               <a:rPr lang="en-US" smtClean="0"/>
-              <a:t>10</a:t>
+              <a:t>11</a:t>
             </a:fld>
             <a:endParaRPr lang="en-US"/>
           </a:p>
@@ -1026,7 +1073,7 @@
           <a:p>
             <a:fld id="{899CA6E9-1B4A-5D4F-A404-1838757C76D1}" type="slidenum">
               <a:rPr lang="en-US" smtClean="0"/>
-              <a:t>11</a:t>
+              <a:t>13</a:t>
             </a:fld>
             <a:endParaRPr lang="en-US"/>
           </a:p>
@@ -1150,7 +1197,7 @@
           <a:p>
             <a:fld id="{899CA6E9-1B4A-5D4F-A404-1838757C76D1}" type="slidenum">
               <a:rPr lang="en-US" smtClean="0"/>
-              <a:t>12</a:t>
+              <a:t>14</a:t>
             </a:fld>
             <a:endParaRPr lang="en-US"/>
           </a:p>
@@ -1272,7 +1319,7 @@
           <a:p>
             <a:fld id="{899CA6E9-1B4A-5D4F-A404-1838757C76D1}" type="slidenum">
               <a:rPr lang="en-US" smtClean="0"/>
-              <a:t>14</a:t>
+              <a:t>16</a:t>
             </a:fld>
             <a:endParaRPr lang="en-US"/>
           </a:p>
@@ -1388,7 +1435,7 @@
           <a:p>
             <a:fld id="{899CA6E9-1B4A-5D4F-A404-1838757C76D1}" type="slidenum">
               <a:rPr lang="en-US" smtClean="0"/>
-              <a:t>15</a:t>
+              <a:t>17</a:t>
             </a:fld>
             <a:endParaRPr lang="en-US"/>
           </a:p>
@@ -1496,7 +1543,7 @@
           <a:p>
             <a:fld id="{899CA6E9-1B4A-5D4F-A404-1838757C76D1}" type="slidenum">
               <a:rPr lang="en-US" smtClean="0"/>
-              <a:t>16</a:t>
+              <a:t>18</a:t>
             </a:fld>
             <a:endParaRPr lang="en-US"/>
           </a:p>
@@ -4615,8 +4662,12 @@
           <a:lstStyle/>
           <a:p>
             <a:r>
-              <a:rPr lang="en-US" dirty="0" smtClean="0"/>
-              <a:t>Benefits together</a:t>
+              <a:rPr lang="en-US" dirty="0" err="1" smtClean="0"/>
+              <a:t>Docker</a:t>
+            </a:r>
+            <a:r>
+              <a:rPr lang="en-US" dirty="0" smtClean="0"/>
+              <a:t> – Benefits</a:t>
             </a:r>
             <a:endParaRPr lang="en-US" dirty="0"/>
           </a:p>
@@ -4641,47 +4692,49 @@
           <a:p>
             <a:r>
               <a:rPr lang="en-US" dirty="0" smtClean="0"/>
-              <a:t>Fully idempotent infrastructure</a:t>
+              <a:t>Cram more applications on a single server</a:t>
             </a:r>
           </a:p>
           <a:p>
             <a:pPr lvl="1"/>
             <a:r>
+              <a:rPr lang="en-US" dirty="0" smtClean="0"/>
+              <a:t>Lighter weight than VMs</a:t>
+            </a:r>
+          </a:p>
+          <a:p>
+            <a:r>
+              <a:rPr lang="en-US" dirty="0" smtClean="0"/>
+              <a:t>Can write a container once and move from </a:t>
+            </a:r>
+            <a:r>
               <a:rPr lang="en-US" dirty="0" err="1" smtClean="0"/>
-              <a:t>Ansible</a:t>
-            </a:r>
-            <a:r>
-              <a:rPr lang="en-US" dirty="0" smtClean="0"/>
-              <a:t> ensures host machines always setup the same way</a:t>
-            </a:r>
-          </a:p>
-          <a:p>
-            <a:pPr lvl="1"/>
-            <a:r>
-              <a:rPr lang="en-US" dirty="0" smtClean="0"/>
-              <a:t>App containers built from scratch with each deployment, so no configuration drift inside containers</a:t>
-            </a:r>
-          </a:p>
-          <a:p>
-            <a:pPr lvl="1"/>
-            <a:r>
-              <a:rPr lang="en-US" dirty="0" smtClean="0"/>
-              <a:t>Minimal configuration on host, so low chance for conflicting configuration settings</a:t>
-            </a:r>
-          </a:p>
-          <a:p>
-            <a:pPr lvl="1"/>
-            <a:r>
-              <a:rPr lang="en-US" dirty="0" smtClean="0"/>
-              <a:t>Encourages best practices for scalable, distributed architecture from day 1</a:t>
-            </a:r>
+              <a:t>dev</a:t>
+            </a:r>
+            <a:r>
+              <a:rPr lang="en-US" dirty="0" smtClean="0"/>
+              <a:t>, test, prod reliably</a:t>
+            </a:r>
+          </a:p>
+          <a:p>
+            <a:r>
+              <a:rPr lang="en-US" dirty="0" smtClean="0"/>
+              <a:t>Lots of third party created containers/images of common software, easier to setup</a:t>
+            </a:r>
+          </a:p>
+          <a:p>
+            <a:r>
+              <a:rPr lang="en-US" dirty="0" smtClean="0"/>
+              <a:t>~0 downtime deployments, deploy new app as new container, swap with running container quickly</a:t>
+            </a:r>
+            <a:endParaRPr lang="en-US" dirty="0"/>
           </a:p>
         </p:txBody>
       </p:sp>
     </p:spTree>
     <p:extLst>
       <p:ext uri="{BB962C8B-B14F-4D97-AF65-F5344CB8AC3E}">
-        <p14:creationId xmlns:p14="http://schemas.microsoft.com/office/powerpoint/2010/main" val="2942627900"/>
+        <p14:creationId xmlns:p14="http://schemas.microsoft.com/office/powerpoint/2010/main" val="3605668980"/>
       </p:ext>
     </p:extLst>
   </p:cSld>
@@ -4725,87 +4778,64 @@
           <a:p>
             <a:r>
               <a:rPr lang="en-US" dirty="0" smtClean="0"/>
-              <a:t>Structuring a </a:t>
-            </a:r>
+              <a:t>Benefits together</a:t>
+            </a:r>
+            <a:endParaRPr lang="en-US" dirty="0"/>
+          </a:p>
+        </p:txBody>
+      </p:sp>
+      <p:sp>
+        <p:nvSpPr>
+          <p:cNvPr id="3" name="Content Placeholder 2"/>
+          <p:cNvSpPr>
+            <a:spLocks noGrp="1"/>
+          </p:cNvSpPr>
+          <p:nvPr>
+            <p:ph idx="1"/>
+          </p:nvPr>
+        </p:nvSpPr>
+        <p:spPr/>
+        <p:txBody>
+          <a:bodyPr>
+            <a:normAutofit lnSpcReduction="10000"/>
+          </a:bodyPr>
+          <a:lstStyle/>
+          <a:p>
+            <a:r>
+              <a:rPr lang="en-US" dirty="0" smtClean="0"/>
+              <a:t>Fully idempotent infrastructure</a:t>
+            </a:r>
+          </a:p>
+          <a:p>
+            <a:pPr lvl="1"/>
             <a:r>
               <a:rPr lang="en-US" dirty="0" err="1" smtClean="0"/>
-              <a:t>Docker</a:t>
-            </a:r>
-            <a:r>
-              <a:rPr lang="en-US" dirty="0" smtClean="0"/>
-              <a:t> app</a:t>
-            </a:r>
-            <a:endParaRPr lang="en-US" dirty="0"/>
-          </a:p>
-        </p:txBody>
-      </p:sp>
-      <p:sp>
-        <p:nvSpPr>
-          <p:cNvPr id="3" name="Content Placeholder 2"/>
-          <p:cNvSpPr>
-            <a:spLocks noGrp="1"/>
-          </p:cNvSpPr>
-          <p:nvPr>
-            <p:ph idx="1"/>
-          </p:nvPr>
-        </p:nvSpPr>
-        <p:spPr/>
-        <p:txBody>
-          <a:bodyPr/>
-          <a:lstStyle/>
-          <a:p>
-            <a:r>
-              <a:rPr lang="en-US" dirty="0" smtClean="0"/>
-              <a:t>12 factor approach</a:t>
+              <a:t>Ansible</a:t>
+            </a:r>
+            <a:r>
+              <a:rPr lang="en-US" dirty="0" smtClean="0"/>
+              <a:t> ensures host machines always setup the same way</a:t>
             </a:r>
           </a:p>
           <a:p>
             <a:pPr lvl="1"/>
             <a:r>
               <a:rPr lang="en-US" dirty="0" smtClean="0"/>
-              <a:t>Inside the container: Static stuff</a:t>
-            </a:r>
-          </a:p>
-          <a:p>
-            <a:pPr lvl="2"/>
-            <a:r>
-              <a:rPr lang="en-US" dirty="0" smtClean="0"/>
-              <a:t>Code</a:t>
-            </a:r>
-          </a:p>
-          <a:p>
-            <a:pPr lvl="2"/>
-            <a:r>
-              <a:rPr lang="en-US" dirty="0" smtClean="0"/>
-              <a:t>Assets</a:t>
+              <a:t>App containers built from scratch with each deployment, so no configuration drift inside containers</a:t>
             </a:r>
           </a:p>
           <a:p>
             <a:pPr lvl="1"/>
             <a:r>
               <a:rPr lang="en-US" dirty="0" smtClean="0"/>
-              <a:t>Outside container: Dynamic stuff</a:t>
-            </a:r>
-          </a:p>
-          <a:p>
-            <a:pPr lvl="2"/>
-            <a:r>
-              <a:rPr lang="en-US" dirty="0" smtClean="0"/>
-              <a:t>Databases</a:t>
-            </a:r>
-          </a:p>
-          <a:p>
-            <a:pPr lvl="2"/>
-            <a:r>
-              <a:rPr lang="en-US" dirty="0" smtClean="0"/>
-              <a:t>File storage</a:t>
-            </a:r>
-          </a:p>
-          <a:p>
-            <a:pPr lvl="2"/>
-            <a:r>
-              <a:rPr lang="en-US" dirty="0" smtClean="0"/>
-              <a:t>Logs</a:t>
+              <a:t>Minimal configuration on host, so low chance for conflicting configuration settings</a:t>
+            </a:r>
+          </a:p>
+          <a:p>
+            <a:pPr lvl="1"/>
+            <a:r>
+              <a:rPr lang="en-US" dirty="0" smtClean="0"/>
+              <a:t>Encourages best practices for scalable, distributed architecture from day 1</a:t>
             </a:r>
           </a:p>
         </p:txBody>
@@ -4813,7 +4843,7 @@
     </p:spTree>
     <p:extLst>
       <p:ext uri="{BB962C8B-B14F-4D97-AF65-F5344CB8AC3E}">
-        <p14:creationId xmlns:p14="http://schemas.microsoft.com/office/powerpoint/2010/main" val="1320013685"/>
+        <p14:creationId xmlns:p14="http://schemas.microsoft.com/office/powerpoint/2010/main" val="2942627900"/>
       </p:ext>
     </p:extLst>
   </p:cSld>
@@ -4852,112 +4882,96 @@
         </p:nvSpPr>
         <p:spPr/>
         <p:txBody>
-          <a:bodyPr>
-            <a:normAutofit fontScale="90000"/>
-          </a:bodyPr>
-          <a:lstStyle/>
-          <a:p>
-            <a:r>
-              <a:rPr lang="en-US" dirty="0" smtClean="0"/>
-              <a:t>Structuring a </a:t>
+          <a:bodyPr/>
+          <a:lstStyle/>
+          <a:p>
+            <a:r>
+              <a:rPr lang="en-US" dirty="0" smtClean="0"/>
+              <a:t>Implementation</a:t>
+            </a:r>
+            <a:endParaRPr lang="en-US" dirty="0"/>
+          </a:p>
+        </p:txBody>
+      </p:sp>
+      <p:sp>
+        <p:nvSpPr>
+          <p:cNvPr id="3" name="Content Placeholder 2"/>
+          <p:cNvSpPr>
+            <a:spLocks noGrp="1"/>
+          </p:cNvSpPr>
+          <p:nvPr>
+            <p:ph idx="1"/>
+          </p:nvPr>
+        </p:nvSpPr>
+        <p:spPr/>
+        <p:txBody>
+          <a:bodyPr/>
+          <a:lstStyle/>
+          <a:p>
+            <a:r>
+              <a:rPr lang="en-US" dirty="0" smtClean="0"/>
+              <a:t>Starting from the inside out</a:t>
+            </a:r>
+          </a:p>
+          <a:p>
+            <a:pPr lvl="1"/>
+            <a:r>
+              <a:rPr lang="en-US" dirty="0" smtClean="0"/>
+              <a:t>How make a </a:t>
             </a:r>
             <a:r>
               <a:rPr lang="en-US" dirty="0" err="1" smtClean="0"/>
-              <a:t>Docker</a:t>
-            </a:r>
-            <a:r>
-              <a:rPr lang="en-US" dirty="0" smtClean="0"/>
-              <a:t> app: </a:t>
+              <a:t>docker</a:t>
+            </a:r>
+            <a:r>
+              <a:rPr lang="en-US" dirty="0" smtClean="0"/>
+              <a:t> container for your app</a:t>
+            </a:r>
+          </a:p>
+          <a:p>
+            <a:pPr lvl="1"/>
+            <a:r>
+              <a:rPr lang="en-US" dirty="0" smtClean="0"/>
+              <a:t>How to deploy a container to a </a:t>
             </a:r>
             <a:r>
               <a:rPr lang="en-US" dirty="0" err="1" smtClean="0"/>
-              <a:t>Dockerfile</a:t>
-            </a:r>
-            <a:endParaRPr lang="en-US" dirty="0"/>
-          </a:p>
-        </p:txBody>
-      </p:sp>
-      <p:sp>
-        <p:nvSpPr>
-          <p:cNvPr id="3" name="Content Placeholder 2"/>
-          <p:cNvSpPr>
-            <a:spLocks noGrp="1"/>
-          </p:cNvSpPr>
-          <p:nvPr>
-            <p:ph idx="1"/>
-          </p:nvPr>
-        </p:nvSpPr>
-        <p:spPr/>
-        <p:txBody>
-          <a:bodyPr>
-            <a:normAutofit fontScale="92500" lnSpcReduction="10000"/>
-          </a:bodyPr>
-          <a:lstStyle/>
-          <a:p>
-            <a:r>
-              <a:rPr lang="en-US" dirty="0" smtClean="0"/>
-              <a:t>Series of commands that progressively build up a container</a:t>
+              <a:t>docker</a:t>
+            </a:r>
+            <a:r>
+              <a:rPr lang="en-US" dirty="0" smtClean="0"/>
+              <a:t> host</a:t>
             </a:r>
           </a:p>
           <a:p>
             <a:pPr lvl="1"/>
             <a:r>
               <a:rPr lang="en-US" dirty="0" smtClean="0"/>
-              <a:t>Add files</a:t>
-            </a:r>
-          </a:p>
-          <a:p>
-            <a:pPr lvl="1"/>
-            <a:r>
-              <a:rPr lang="en-US" dirty="0" smtClean="0"/>
-              <a:t>Install packages</a:t>
-            </a:r>
-          </a:p>
-          <a:p>
-            <a:pPr lvl="1"/>
-            <a:r>
-              <a:rPr lang="en-US" dirty="0" smtClean="0"/>
-              <a:t>Set environment variables</a:t>
-            </a:r>
-          </a:p>
-          <a:p>
-            <a:pPr lvl="1"/>
-            <a:r>
-              <a:rPr lang="en-US" dirty="0" smtClean="0"/>
-              <a:t>Run configuration commands</a:t>
-            </a:r>
-          </a:p>
-          <a:p>
-            <a:pPr lvl="1"/>
-            <a:r>
-              <a:rPr lang="en-US" dirty="0" smtClean="0"/>
-              <a:t>Define start up commands</a:t>
-            </a:r>
-          </a:p>
-          <a:p>
-            <a:r>
-              <a:rPr lang="en-US" dirty="0" smtClean="0"/>
-              <a:t>Rudimentary inheritance mechanism</a:t>
-            </a:r>
-          </a:p>
-          <a:p>
-            <a:r>
-              <a:rPr lang="en-US" dirty="0" smtClean="0"/>
-              <a:t>Relies on clever caching mechanism so it can skip steps if nothing has changed</a:t>
-            </a:r>
-          </a:p>
-          <a:p>
-            <a:pPr marL="0" indent="0">
-              <a:buNone/>
-            </a:pPr>
-            <a:endParaRPr lang="en-US" dirty="0"/>
+              <a:t>How to setup a </a:t>
+            </a:r>
+            <a:r>
+              <a:rPr lang="en-US" dirty="0" err="1" smtClean="0"/>
+              <a:t>docker</a:t>
+            </a:r>
+            <a:r>
+              <a:rPr lang="en-US" dirty="0" smtClean="0"/>
+              <a:t> host with </a:t>
+            </a:r>
+            <a:r>
+              <a:rPr lang="en-US" dirty="0" err="1" smtClean="0"/>
+              <a:t>docker</a:t>
+            </a:r>
+            <a:r>
+              <a:rPr lang="en-US" dirty="0" smtClean="0"/>
+              <a:t> and related services</a:t>
+            </a:r>
           </a:p>
         </p:txBody>
       </p:sp>
     </p:spTree>
     <p:extLst>
       <p:ext uri="{BB962C8B-B14F-4D97-AF65-F5344CB8AC3E}">
-        <p14:creationId xmlns:p14="http://schemas.microsoft.com/office/powerpoint/2010/main" val="1870890385"/>
+        <p14:creationId xmlns:p14="http://schemas.microsoft.com/office/powerpoint/2010/main" val="3530676897"/>
       </p:ext>
     </p:extLst>
   </p:cSld>
@@ -5003,7 +5017,7 @@
           <a:p>
             <a:r>
               <a:rPr lang="en-US" dirty="0" smtClean="0"/>
-              <a:t>Structuring a </a:t>
+              <a:t>Building a </a:t>
             </a:r>
             <a:r>
               <a:rPr lang="en-US" dirty="0" err="1" smtClean="0"/>
@@ -5011,7 +5025,11 @@
             </a:r>
             <a:r>
               <a:rPr lang="en-US" dirty="0" smtClean="0"/>
-              <a:t> app: Building the Container</a:t>
+              <a:t> Container: App </a:t>
+            </a:r>
+            <a:r>
+              <a:rPr lang="en-US" dirty="0" err="1" smtClean="0"/>
+              <a:t>Strucuture</a:t>
             </a:r>
             <a:endParaRPr lang="en-US" dirty="0"/>
           </a:p>
@@ -5034,65 +5052,64 @@
           <a:p>
             <a:r>
               <a:rPr lang="en-US" dirty="0" smtClean="0"/>
-              <a:t>Run </a:t>
-            </a:r>
-            <a:r>
-              <a:rPr lang="en-US" i="1" dirty="0" err="1" smtClean="0"/>
-              <a:t>docker</a:t>
-            </a:r>
-            <a:r>
-              <a:rPr lang="en-US" i="1" dirty="0" smtClean="0"/>
-              <a:t> build </a:t>
-            </a:r>
-            <a:r>
-              <a:rPr lang="en-US" dirty="0" smtClean="0"/>
-              <a:t>against </a:t>
-            </a:r>
-            <a:r>
-              <a:rPr lang="en-US" dirty="0" err="1" smtClean="0"/>
-              <a:t>dockerfile</a:t>
-            </a:r>
-            <a:endParaRPr lang="en-US" dirty="0" smtClean="0"/>
+              <a:t>12 factor approach</a:t>
+            </a:r>
           </a:p>
           <a:p>
             <a:pPr lvl="1"/>
             <a:r>
               <a:rPr lang="en-US" dirty="0" smtClean="0"/>
-              <a:t>Creates an “image”</a:t>
-            </a:r>
-          </a:p>
-          <a:p>
-            <a:r>
-              <a:rPr lang="en-US" dirty="0" smtClean="0"/>
-              <a:t>Run </a:t>
-            </a:r>
-            <a:r>
-              <a:rPr lang="en-US" i="1" dirty="0" err="1" smtClean="0"/>
-              <a:t>docker</a:t>
-            </a:r>
-            <a:r>
-              <a:rPr lang="en-US" i="1" dirty="0" smtClean="0"/>
-              <a:t> start </a:t>
-            </a:r>
-            <a:r>
-              <a:rPr lang="en-US" dirty="0" smtClean="0"/>
-              <a:t>against an image</a:t>
+              <a:t>Inside the container: Static stuff</a:t>
+            </a:r>
+          </a:p>
+          <a:p>
+            <a:pPr lvl="2"/>
+            <a:r>
+              <a:rPr lang="en-US" dirty="0" smtClean="0"/>
+              <a:t>Code</a:t>
+            </a:r>
+          </a:p>
+          <a:p>
+            <a:pPr lvl="2"/>
+            <a:r>
+              <a:rPr lang="en-US" dirty="0" smtClean="0"/>
+              <a:t>Assets</a:t>
             </a:r>
           </a:p>
           <a:p>
             <a:pPr lvl="1"/>
             <a:r>
               <a:rPr lang="en-US" dirty="0" smtClean="0"/>
-              <a:t>Starts a container using that image</a:t>
-            </a:r>
-            <a:endParaRPr lang="en-US" dirty="0"/>
+              <a:t>Outside container: Dynamic stuff</a:t>
+            </a:r>
+          </a:p>
+          <a:p>
+            <a:pPr lvl="2"/>
+            <a:r>
+              <a:rPr lang="en-US" dirty="0" smtClean="0"/>
+              <a:t>Databases</a:t>
+            </a:r>
+          </a:p>
+          <a:p>
+            <a:pPr lvl="2"/>
+            <a:r>
+              <a:rPr lang="en-US" dirty="0" smtClean="0"/>
+              <a:t>File storage</a:t>
+            </a:r>
+          </a:p>
+          <a:p>
+            <a:pPr lvl="2"/>
+            <a:r>
+              <a:rPr lang="en-US" dirty="0" smtClean="0"/>
+              <a:t>Logs</a:t>
+            </a:r>
           </a:p>
         </p:txBody>
       </p:sp>
     </p:spTree>
     <p:extLst>
       <p:ext uri="{BB962C8B-B14F-4D97-AF65-F5344CB8AC3E}">
-        <p14:creationId xmlns:p14="http://schemas.microsoft.com/office/powerpoint/2010/main" val="1701297863"/>
+        <p14:creationId xmlns:p14="http://schemas.microsoft.com/office/powerpoint/2010/main" val="1320013685"/>
       </p:ext>
     </p:extLst>
   </p:cSld>
@@ -5137,8 +5154,20 @@
           <a:lstStyle/>
           <a:p>
             <a:r>
-              <a:rPr lang="en-US" dirty="0" smtClean="0"/>
-              <a:t>Deploying the App</a:t>
+              <a:rPr lang="en-US" dirty="0"/>
+              <a:t>Building a </a:t>
+            </a:r>
+            <a:r>
+              <a:rPr lang="en-US" dirty="0" err="1"/>
+              <a:t>Docker</a:t>
+            </a:r>
+            <a:r>
+              <a:rPr lang="en-US" dirty="0"/>
+              <a:t> App: </a:t>
+            </a:r>
+            <a:r>
+              <a:rPr lang="en-US" dirty="0" err="1" smtClean="0"/>
+              <a:t>Dockerfile</a:t>
             </a:r>
             <a:endParaRPr lang="en-US" dirty="0"/>
           </a:p>
@@ -5156,60 +5185,75 @@
         </p:nvSpPr>
         <p:spPr/>
         <p:txBody>
-          <a:bodyPr/>
-          <a:lstStyle/>
-          <a:p>
-            <a:r>
-              <a:rPr lang="en-US" dirty="0" smtClean="0"/>
-              <a:t>Most configuration lives in container via </a:t>
-            </a:r>
-            <a:r>
-              <a:rPr lang="en-US" dirty="0" err="1" smtClean="0"/>
-              <a:t>dockerfile</a:t>
-            </a:r>
-            <a:endParaRPr lang="en-US" dirty="0" smtClean="0"/>
-          </a:p>
-          <a:p>
-            <a:r>
-              <a:rPr lang="en-US" dirty="0" smtClean="0"/>
-              <a:t>Only need to handle following concerns on host (via </a:t>
-            </a:r>
-            <a:r>
-              <a:rPr lang="en-US" dirty="0" err="1" smtClean="0"/>
-              <a:t>ansible</a:t>
-            </a:r>
-            <a:r>
-              <a:rPr lang="en-US" dirty="0" smtClean="0"/>
-              <a:t> playbook)</a:t>
+          <a:bodyPr>
+            <a:normAutofit fontScale="92500" lnSpcReduction="10000"/>
+          </a:bodyPr>
+          <a:lstStyle/>
+          <a:p>
+            <a:r>
+              <a:rPr lang="en-US" dirty="0" smtClean="0"/>
+              <a:t>Series of commands that progressively build up a container</a:t>
             </a:r>
           </a:p>
           <a:p>
             <a:pPr lvl="1"/>
             <a:r>
               <a:rPr lang="en-US" dirty="0" smtClean="0"/>
-              <a:t>Copy application code to temporary location</a:t>
+              <a:t>Add files</a:t>
             </a:r>
           </a:p>
           <a:p>
             <a:pPr lvl="1"/>
             <a:r>
               <a:rPr lang="en-US" dirty="0" smtClean="0"/>
-              <a:t>Build image from code</a:t>
+              <a:t>Install packages</a:t>
             </a:r>
           </a:p>
           <a:p>
             <a:pPr lvl="1"/>
             <a:r>
               <a:rPr lang="en-US" dirty="0" smtClean="0"/>
-              <a:t>Stop old containers, start new ones</a:t>
-            </a:r>
+              <a:t>Set environment variables</a:t>
+            </a:r>
+          </a:p>
+          <a:p>
+            <a:pPr lvl="1"/>
+            <a:r>
+              <a:rPr lang="en-US" dirty="0" smtClean="0"/>
+              <a:t>Run configuration commands</a:t>
+            </a:r>
+          </a:p>
+          <a:p>
+            <a:pPr lvl="1"/>
+            <a:r>
+              <a:rPr lang="en-US" dirty="0" smtClean="0"/>
+              <a:t>Define start up commands</a:t>
+            </a:r>
+          </a:p>
+          <a:p>
+            <a:r>
+              <a:rPr lang="en-US" dirty="0" smtClean="0"/>
+              <a:t>Rudimentary inheritance mechanism</a:t>
+            </a:r>
+          </a:p>
+          <a:p>
+            <a:r>
+              <a:rPr lang="en-US" dirty="0" smtClean="0"/>
+              <a:t>Relies on clever caching mechanism so it can skip steps if nothing has changed</a:t>
+            </a:r>
+          </a:p>
+          <a:p>
+            <a:pPr marL="0" indent="0">
+              <a:buNone/>
+            </a:pPr>
+            <a:endParaRPr lang="en-US" dirty="0"/>
           </a:p>
         </p:txBody>
       </p:sp>
     </p:spTree>
     <p:extLst>
       <p:ext uri="{BB962C8B-B14F-4D97-AF65-F5344CB8AC3E}">
-        <p14:creationId xmlns:p14="http://schemas.microsoft.com/office/powerpoint/2010/main" val="4202944130"/>
+        <p14:creationId xmlns:p14="http://schemas.microsoft.com/office/powerpoint/2010/main" val="1870890385"/>
       </p:ext>
     </p:extLst>
   </p:cSld>
@@ -5249,17 +5293,21 @@
         <p:spPr/>
         <p:txBody>
           <a:bodyPr>
-            <a:normAutofit fontScale="90000"/>
+            <a:normAutofit/>
           </a:bodyPr>
           <a:lstStyle/>
           <a:p>
             <a:r>
               <a:rPr lang="en-US" dirty="0" smtClean="0"/>
-              <a:t>Deploying the App: Environment </a:t>
+              <a:t>Building a </a:t>
             </a:r>
             <a:r>
               <a:rPr lang="en-US" dirty="0" err="1" smtClean="0"/>
-              <a:t>Config</a:t>
+              <a:t>Docker</a:t>
+            </a:r>
+            <a:r>
+              <a:rPr lang="en-US" dirty="0" smtClean="0"/>
+              <a:t> App: Commands</a:t>
             </a:r>
             <a:endParaRPr lang="en-US" dirty="0"/>
           </a:p>
@@ -5277,87 +5325,61 @@
         </p:nvSpPr>
         <p:spPr/>
         <p:txBody>
-          <a:bodyPr>
-            <a:normAutofit fontScale="92500" lnSpcReduction="20000"/>
-          </a:bodyPr>
-          <a:lstStyle/>
-          <a:p>
-            <a:r>
-              <a:rPr lang="en-US" dirty="0" smtClean="0"/>
-              <a:t>Store non-sensitive variables in deployment scripts via roles for each environment</a:t>
-            </a:r>
-            <a:endParaRPr lang="en-US" dirty="0"/>
+          <a:bodyPr/>
+          <a:lstStyle/>
+          <a:p>
+            <a:r>
+              <a:rPr lang="en-US" dirty="0" smtClean="0"/>
+              <a:t>Run </a:t>
+            </a:r>
+            <a:r>
+              <a:rPr lang="en-US" i="1" dirty="0" err="1" smtClean="0"/>
+              <a:t>docker</a:t>
+            </a:r>
+            <a:r>
+              <a:rPr lang="en-US" i="1" dirty="0" smtClean="0"/>
+              <a:t> build </a:t>
+            </a:r>
+            <a:r>
+              <a:rPr lang="en-US" dirty="0" smtClean="0"/>
+              <a:t>against </a:t>
+            </a:r>
+            <a:r>
+              <a:rPr lang="en-US" dirty="0" err="1" smtClean="0"/>
+              <a:t>dockerfile</a:t>
+            </a:r>
+            <a:endParaRPr lang="en-US" dirty="0" smtClean="0"/>
           </a:p>
           <a:p>
             <a:pPr lvl="1"/>
             <a:r>
               <a:rPr lang="en-US" dirty="0" smtClean="0"/>
-              <a:t>Select role by single variable passed to </a:t>
-            </a:r>
-            <a:r>
-              <a:rPr lang="en-US" dirty="0" err="1" smtClean="0"/>
-              <a:t>ansible</a:t>
-            </a:r>
-            <a:r>
-              <a:rPr lang="en-US" dirty="0" smtClean="0"/>
-              <a:t> on command line</a:t>
-            </a:r>
-          </a:p>
-          <a:p>
-            <a:r>
-              <a:rPr lang="en-US" dirty="0" smtClean="0"/>
-              <a:t>Setting sensitive environment variables</a:t>
+              <a:t>Creates an “image”</a:t>
+            </a:r>
+          </a:p>
+          <a:p>
+            <a:r>
+              <a:rPr lang="en-US" dirty="0" smtClean="0"/>
+              <a:t>Run </a:t>
+            </a:r>
+            <a:r>
+              <a:rPr lang="en-US" i="1" dirty="0" err="1" smtClean="0"/>
+              <a:t>docker</a:t>
+            </a:r>
+            <a:r>
+              <a:rPr lang="en-US" i="1" dirty="0" smtClean="0"/>
+              <a:t> start </a:t>
+            </a:r>
+            <a:r>
+              <a:rPr lang="en-US" dirty="0" smtClean="0"/>
+              <a:t>against an image</a:t>
             </a:r>
           </a:p>
           <a:p>
             <a:pPr lvl="1"/>
             <a:r>
               <a:rPr lang="en-US" dirty="0" smtClean="0"/>
-              <a:t>Can run </a:t>
-            </a:r>
-            <a:r>
-              <a:rPr lang="en-US" dirty="0" err="1" smtClean="0"/>
-              <a:t>ansible</a:t>
-            </a:r>
-            <a:r>
-              <a:rPr lang="en-US" dirty="0" smtClean="0"/>
-              <a:t> manually and pass in values from command line</a:t>
-            </a:r>
-          </a:p>
-          <a:p>
-            <a:pPr lvl="1"/>
-            <a:r>
-              <a:rPr lang="en-US" dirty="0" smtClean="0"/>
-              <a:t>Can store in source control and encrypt with </a:t>
-            </a:r>
-            <a:r>
-              <a:rPr lang="en-US" dirty="0" err="1" smtClean="0"/>
-              <a:t>ansible</a:t>
-            </a:r>
-            <a:r>
-              <a:rPr lang="en-US" dirty="0" smtClean="0"/>
-              <a:t> vault</a:t>
-            </a:r>
-          </a:p>
-          <a:p>
-            <a:pPr lvl="2"/>
-            <a:r>
-              <a:rPr lang="en-US" dirty="0" smtClean="0"/>
-              <a:t>Encrypt file on local machine with password</a:t>
-            </a:r>
-          </a:p>
-          <a:p>
-            <a:pPr lvl="2"/>
-            <a:r>
-              <a:rPr lang="en-US" dirty="0" smtClean="0"/>
-              <a:t>Put password in environment variable on build machine</a:t>
-            </a:r>
-          </a:p>
-          <a:p>
-            <a:pPr lvl="2"/>
-            <a:r>
-              <a:rPr lang="en-US" dirty="0" smtClean="0"/>
-              <a:t>Build machine decrypts file with variables during build</a:t>
+              <a:t>Starts a container using that image</a:t>
             </a:r>
             <a:endParaRPr lang="en-US" dirty="0"/>
           </a:p>
@@ -5366,7 +5388,7 @@
     </p:spTree>
     <p:extLst>
       <p:ext uri="{BB962C8B-B14F-4D97-AF65-F5344CB8AC3E}">
-        <p14:creationId xmlns:p14="http://schemas.microsoft.com/office/powerpoint/2010/main" val="1780227698"/>
+        <p14:creationId xmlns:p14="http://schemas.microsoft.com/office/powerpoint/2010/main" val="1701297863"/>
       </p:ext>
     </p:extLst>
   </p:cSld>
@@ -5405,43 +5427,48 @@
         </p:nvSpPr>
         <p:spPr/>
         <p:txBody>
-          <a:bodyPr/>
-          <a:lstStyle/>
-          <a:p>
-            <a:r>
-              <a:rPr lang="en-US" dirty="0" smtClean="0"/>
-              <a:t>Building a </a:t>
+          <a:bodyPr>
+            <a:normAutofit/>
+          </a:bodyPr>
+          <a:lstStyle/>
+          <a:p>
+            <a:r>
+              <a:rPr lang="en-US" dirty="0" smtClean="0"/>
+              <a:t>Deploying the App</a:t>
+            </a:r>
+            <a:endParaRPr lang="en-US" dirty="0"/>
+          </a:p>
+        </p:txBody>
+      </p:sp>
+      <p:sp>
+        <p:nvSpPr>
+          <p:cNvPr id="3" name="Content Placeholder 2"/>
+          <p:cNvSpPr>
+            <a:spLocks noGrp="1"/>
+          </p:cNvSpPr>
+          <p:nvPr>
+            <p:ph idx="1"/>
+          </p:nvPr>
+        </p:nvSpPr>
+        <p:spPr/>
+        <p:txBody>
+          <a:bodyPr/>
+          <a:lstStyle/>
+          <a:p>
+            <a:r>
+              <a:rPr lang="en-US" dirty="0" smtClean="0"/>
+              <a:t>Most configuration lives in container via </a:t>
             </a:r>
             <a:r>
               <a:rPr lang="en-US" dirty="0" err="1" smtClean="0"/>
-              <a:t>Docker</a:t>
-            </a:r>
-            <a:r>
-              <a:rPr lang="en-US" dirty="0" smtClean="0"/>
-              <a:t> Host</a:t>
-            </a:r>
-            <a:endParaRPr lang="en-US" dirty="0"/>
-          </a:p>
-        </p:txBody>
-      </p:sp>
-      <p:sp>
-        <p:nvSpPr>
-          <p:cNvPr id="3" name="Content Placeholder 2"/>
-          <p:cNvSpPr>
-            <a:spLocks noGrp="1"/>
-          </p:cNvSpPr>
-          <p:nvPr>
-            <p:ph idx="1"/>
-          </p:nvPr>
-        </p:nvSpPr>
-        <p:spPr/>
-        <p:txBody>
-          <a:bodyPr/>
-          <a:lstStyle/>
-          <a:p>
-            <a:r>
-              <a:rPr lang="en-US" dirty="0" smtClean="0"/>
-              <a:t>Use </a:t>
+              <a:t>dockerfile</a:t>
+            </a:r>
+            <a:endParaRPr lang="en-US" dirty="0" smtClean="0"/>
+          </a:p>
+          <a:p>
+            <a:r>
+              <a:rPr lang="en-US" dirty="0" smtClean="0"/>
+              <a:t>Only need to handle following concerns on host (via </a:t>
             </a:r>
             <a:r>
               <a:rPr lang="en-US" dirty="0" err="1" smtClean="0"/>
@@ -5449,49 +5476,36 @@
             </a:r>
             <a:r>
               <a:rPr lang="en-US" dirty="0" smtClean="0"/>
-              <a:t> to setup common services and containers </a:t>
+              <a:t> playbook)</a:t>
             </a:r>
           </a:p>
           <a:p>
             <a:pPr lvl="1"/>
             <a:r>
               <a:rPr lang="en-US" dirty="0" smtClean="0"/>
-              <a:t>Install </a:t>
-            </a:r>
-            <a:r>
-              <a:rPr lang="en-US" dirty="0" err="1" smtClean="0"/>
-              <a:t>Docker</a:t>
-            </a:r>
-            <a:endParaRPr lang="en-US" dirty="0" smtClean="0"/>
+              <a:t>Copy application code to temporary location</a:t>
+            </a:r>
           </a:p>
           <a:p>
             <a:pPr lvl="1"/>
             <a:r>
               <a:rPr lang="en-US" dirty="0" smtClean="0"/>
-              <a:t>Setup reverse proxy webserver</a:t>
+              <a:t>Build image from code</a:t>
             </a:r>
           </a:p>
           <a:p>
             <a:pPr lvl="1"/>
             <a:r>
               <a:rPr lang="en-US" dirty="0" smtClean="0"/>
-              <a:t>Centralized logging</a:t>
-            </a:r>
-          </a:p>
-          <a:p>
-            <a:pPr lvl="1"/>
-            <a:r>
-              <a:rPr lang="en-US" dirty="0" smtClean="0"/>
-              <a:t>Application monitoring</a:t>
-            </a:r>
-            <a:endParaRPr lang="en-US" dirty="0"/>
+              <a:t>Stop old containers, start new ones</a:t>
+            </a:r>
           </a:p>
         </p:txBody>
       </p:sp>
     </p:spTree>
     <p:extLst>
       <p:ext uri="{BB962C8B-B14F-4D97-AF65-F5344CB8AC3E}">
-        <p14:creationId xmlns:p14="http://schemas.microsoft.com/office/powerpoint/2010/main" val="1518226122"/>
+        <p14:creationId xmlns:p14="http://schemas.microsoft.com/office/powerpoint/2010/main" val="4202944130"/>
       </p:ext>
     </p:extLst>
   </p:cSld>
@@ -5537,15 +5551,11 @@
           <a:p>
             <a:r>
               <a:rPr lang="en-US" dirty="0" smtClean="0"/>
-              <a:t>Building a </a:t>
+              <a:t>Deploying the App: Environment </a:t>
             </a:r>
             <a:r>
               <a:rPr lang="en-US" dirty="0" err="1" smtClean="0"/>
-              <a:t>Docker</a:t>
-            </a:r>
-            <a:r>
-              <a:rPr lang="en-US" dirty="0" smtClean="0"/>
-              <a:t> Host: Reverse Proxy</a:t>
+              <a:t>Config</a:t>
             </a:r>
             <a:endParaRPr lang="en-US" dirty="0"/>
           </a:p>
@@ -5570,79 +5580,81 @@
           <a:p>
             <a:r>
               <a:rPr lang="en-US" dirty="0" smtClean="0"/>
-              <a:t>Why?</a:t>
-            </a:r>
+              <a:t>Store non-sensitive variables in deployment scripts via roles for each environment</a:t>
+            </a:r>
+            <a:endParaRPr lang="en-US" dirty="0"/>
           </a:p>
           <a:p>
             <a:pPr lvl="1"/>
             <a:r>
               <a:rPr lang="en-US" dirty="0" smtClean="0"/>
-              <a:t>Multiple containers on a single server, each a separate process</a:t>
+              <a:t>Select role by single variable passed to </a:t>
+            </a:r>
+            <a:r>
+              <a:rPr lang="en-US" dirty="0" err="1" smtClean="0"/>
+              <a:t>ansible</a:t>
+            </a:r>
+            <a:r>
+              <a:rPr lang="en-US" dirty="0" smtClean="0"/>
+              <a:t> on command line</a:t>
+            </a:r>
+          </a:p>
+          <a:p>
+            <a:r>
+              <a:rPr lang="en-US" dirty="0" smtClean="0"/>
+              <a:t>Setting sensitive environment variables</a:t>
             </a:r>
           </a:p>
           <a:p>
             <a:pPr lvl="1"/>
             <a:r>
               <a:rPr lang="en-US" dirty="0" smtClean="0"/>
-              <a:t>Can’t all listen to port 80 on the host</a:t>
+              <a:t>Can run </a:t>
+            </a:r>
+            <a:r>
+              <a:rPr lang="en-US" dirty="0" err="1" smtClean="0"/>
+              <a:t>ansible</a:t>
+            </a:r>
+            <a:r>
+              <a:rPr lang="en-US" dirty="0" smtClean="0"/>
+              <a:t> manually and pass in values from command line</a:t>
             </a:r>
           </a:p>
           <a:p>
             <a:pPr lvl="1"/>
             <a:r>
               <a:rPr lang="en-US" dirty="0" smtClean="0"/>
-              <a:t>Setup single reverse proxy webserver which proxies requests to internal IPs for each container</a:t>
-            </a:r>
-          </a:p>
-          <a:p>
-            <a:r>
-              <a:rPr lang="en-US" dirty="0" smtClean="0"/>
-              <a:t>How?</a:t>
-            </a:r>
-          </a:p>
-          <a:p>
-            <a:pPr lvl="1"/>
+              <a:t>Can store in source control and encrypt with </a:t>
+            </a:r>
             <a:r>
               <a:rPr lang="en-US" dirty="0" err="1" smtClean="0"/>
-              <a:t>Nginx</a:t>
-            </a:r>
-            <a:r>
-              <a:rPr lang="en-US" dirty="0" smtClean="0"/>
-              <a:t> running in container</a:t>
-            </a:r>
-          </a:p>
-          <a:p>
-            <a:pPr lvl="1"/>
-            <a:r>
-              <a:rPr lang="en-US" dirty="0" err="1" smtClean="0"/>
-              <a:t>Docker</a:t>
-            </a:r>
-            <a:r>
-              <a:rPr lang="en-US" dirty="0" smtClean="0"/>
-              <a:t> gen in linked container</a:t>
-            </a:r>
-          </a:p>
-          <a:p>
-            <a:pPr lvl="1"/>
-            <a:r>
-              <a:rPr lang="en-US" dirty="0" err="1" smtClean="0"/>
-              <a:t>Docker</a:t>
-            </a:r>
-            <a:r>
-              <a:rPr lang="en-US" dirty="0" smtClean="0"/>
-              <a:t> gen dynamically creates </a:t>
-            </a:r>
-            <a:r>
-              <a:rPr lang="en-US" dirty="0" err="1" smtClean="0"/>
-              <a:t>nginx</a:t>
-            </a:r>
-            <a:r>
-              <a:rPr lang="en-US" dirty="0" smtClean="0"/>
-              <a:t> configuration file with proper reverse proxy settings</a:t>
-            </a:r>
-          </a:p>
-          <a:p>
-            <a:pPr lvl="1"/>
+              <a:t>ansible</a:t>
+            </a:r>
+            <a:r>
+              <a:rPr lang="en-US" dirty="0" smtClean="0"/>
+              <a:t> vault</a:t>
+            </a:r>
+          </a:p>
+          <a:p>
+            <a:pPr lvl="2"/>
+            <a:r>
+              <a:rPr lang="en-US" dirty="0" smtClean="0"/>
+              <a:t>Encrypt file on local machine with password</a:t>
+            </a:r>
+          </a:p>
+          <a:p>
+            <a:pPr lvl="2"/>
+            <a:r>
+              <a:rPr lang="en-US" dirty="0" smtClean="0"/>
+              <a:t>Put password in environment variable on build machine</a:t>
+            </a:r>
+          </a:p>
+          <a:p>
+            <a:pPr lvl="2"/>
+            <a:r>
+              <a:rPr lang="en-US" dirty="0" smtClean="0"/>
+              <a:t>Build machine decrypts file with variables during build</a:t>
+            </a:r>
             <a:endParaRPr lang="en-US" dirty="0"/>
           </a:p>
         </p:txBody>
@@ -5650,7 +5662,7 @@
     </p:spTree>
     <p:extLst>
       <p:ext uri="{BB962C8B-B14F-4D97-AF65-F5344CB8AC3E}">
-        <p14:creationId xmlns:p14="http://schemas.microsoft.com/office/powerpoint/2010/main" val="3394323431"/>
+        <p14:creationId xmlns:p14="http://schemas.microsoft.com/office/powerpoint/2010/main" val="1780227698"/>
       </p:ext>
     </p:extLst>
   </p:cSld>
@@ -5689,9 +5701,7 @@
         </p:nvSpPr>
         <p:spPr/>
         <p:txBody>
-          <a:bodyPr>
-            <a:normAutofit fontScale="90000"/>
-          </a:bodyPr>
+          <a:bodyPr/>
           <a:lstStyle/>
           <a:p>
             <a:r>
@@ -5704,7 +5714,7 @@
             </a:r>
             <a:r>
               <a:rPr lang="en-US" dirty="0" smtClean="0"/>
-              <a:t> Host: Centralized Logging</a:t>
+              <a:t> Host</a:t>
             </a:r>
             <a:endParaRPr lang="en-US" dirty="0"/>
           </a:p>
@@ -5722,126 +5732,64 @@
         </p:nvSpPr>
         <p:spPr/>
         <p:txBody>
-          <a:bodyPr>
-            <a:normAutofit fontScale="85000" lnSpcReduction="10000"/>
-          </a:bodyPr>
-          <a:lstStyle/>
-          <a:p>
-            <a:r>
-              <a:rPr lang="en-US" dirty="0" smtClean="0"/>
-              <a:t>Out of the box</a:t>
-            </a:r>
+          <a:bodyPr/>
+          <a:lstStyle/>
+          <a:p>
+            <a:r>
+              <a:rPr lang="en-US" dirty="0" smtClean="0"/>
+              <a:t>Using </a:t>
+            </a:r>
+            <a:r>
+              <a:rPr lang="en-US" dirty="0" err="1" smtClean="0"/>
+              <a:t>ansible</a:t>
+            </a:r>
+            <a:endParaRPr lang="en-US" dirty="0" smtClean="0"/>
           </a:p>
           <a:p>
             <a:pPr lvl="1"/>
             <a:r>
               <a:rPr lang="en-US" dirty="0" smtClean="0"/>
-              <a:t>Inside container, apps should just log everything to </a:t>
-            </a:r>
-            <a:r>
-              <a:rPr lang="en-US" dirty="0" err="1" smtClean="0"/>
-              <a:t>stdout</a:t>
-            </a:r>
-            <a:endParaRPr lang="en-US" dirty="0" smtClean="0"/>
-          </a:p>
-          <a:p>
-            <a:pPr lvl="1"/>
+              <a:t>Install </a:t>
+            </a:r>
             <a:r>
               <a:rPr lang="en-US" dirty="0" err="1" smtClean="0"/>
               <a:t>Docker</a:t>
             </a:r>
-            <a:r>
-              <a:rPr lang="en-US" dirty="0" smtClean="0"/>
-              <a:t> redirects </a:t>
+            <a:endParaRPr lang="en-US" dirty="0" smtClean="0"/>
+          </a:p>
+          <a:p>
+            <a:pPr lvl="1"/>
+            <a:r>
+              <a:rPr lang="en-US" dirty="0" smtClean="0"/>
+              <a:t>Setup reverse proxy </a:t>
+            </a:r>
+            <a:r>
+              <a:rPr lang="en-US" dirty="0" smtClean="0"/>
+              <a:t>webserver </a:t>
+            </a:r>
+            <a:endParaRPr lang="en-US" dirty="0" smtClean="0"/>
+          </a:p>
+          <a:p>
+            <a:pPr lvl="1"/>
+            <a:r>
+              <a:rPr lang="en-US" dirty="0" smtClean="0"/>
+              <a:t>Setup Centralized </a:t>
+            </a:r>
+            <a:r>
+              <a:rPr lang="en-US" dirty="0" smtClean="0"/>
+              <a:t>logging</a:t>
+            </a:r>
+          </a:p>
+          <a:p>
+            <a:pPr lvl="1"/>
+            <a:r>
+              <a:rPr lang="en-US" dirty="0" smtClean="0"/>
+              <a:t>Setup application monitoring with </a:t>
             </a:r>
             <a:r>
               <a:rPr lang="en-US" dirty="0" err="1" smtClean="0"/>
-              <a:t>stdout</a:t>
-            </a:r>
-            <a:r>
-              <a:rPr lang="en-US" dirty="0" smtClean="0"/>
-              <a:t> to log files for each container</a:t>
-            </a:r>
-          </a:p>
-          <a:p>
-            <a:pPr lvl="1"/>
-            <a:r>
-              <a:rPr lang="en-US" dirty="0" smtClean="0"/>
-              <a:t>Can read via </a:t>
-            </a:r>
-            <a:r>
-              <a:rPr lang="en-US" dirty="0" err="1" smtClean="0"/>
-              <a:t>docker</a:t>
-            </a:r>
-            <a:r>
-              <a:rPr lang="en-US" dirty="0" smtClean="0"/>
-              <a:t> logs</a:t>
-            </a:r>
-          </a:p>
-          <a:p>
-            <a:pPr lvl="1"/>
-            <a:r>
-              <a:rPr lang="en-US" dirty="0" smtClean="0"/>
-              <a:t>Log files grow unbounded (yikes!)</a:t>
-            </a:r>
-          </a:p>
-          <a:p>
-            <a:r>
-              <a:rPr lang="en-US" dirty="0" smtClean="0"/>
-              <a:t>Best practice</a:t>
-            </a:r>
-          </a:p>
-          <a:p>
-            <a:pPr lvl="1"/>
-            <a:r>
-              <a:rPr lang="en-US" dirty="0" err="1" smtClean="0"/>
-              <a:t>Logspout</a:t>
-            </a:r>
-            <a:endParaRPr lang="en-US" dirty="0" smtClean="0"/>
-          </a:p>
-          <a:p>
-            <a:pPr lvl="1"/>
-            <a:r>
-              <a:rPr lang="en-US" dirty="0" err="1" smtClean="0"/>
-              <a:t>Docker</a:t>
-            </a:r>
-            <a:r>
-              <a:rPr lang="en-US" dirty="0" smtClean="0"/>
-              <a:t> container which can redirect logs to wherever you need them</a:t>
-            </a:r>
-          </a:p>
-          <a:p>
-            <a:pPr lvl="1"/>
-            <a:r>
-              <a:rPr lang="en-US" dirty="0" smtClean="0"/>
-              <a:t>Send over UDP to logging service (</a:t>
-            </a:r>
-            <a:r>
-              <a:rPr lang="en-US" dirty="0" err="1" smtClean="0"/>
-              <a:t>Papertrail</a:t>
-            </a:r>
-            <a:r>
-              <a:rPr lang="en-US" dirty="0" smtClean="0"/>
-              <a:t>, </a:t>
-            </a:r>
-            <a:r>
-              <a:rPr lang="en-US" dirty="0" err="1" smtClean="0"/>
-              <a:t>loggly</a:t>
-            </a:r>
-            <a:r>
-              <a:rPr lang="en-US" dirty="0" smtClean="0"/>
-              <a:t>, </a:t>
-            </a:r>
-            <a:r>
-              <a:rPr lang="en-US" dirty="0" err="1" smtClean="0"/>
-              <a:t>etc</a:t>
-            </a:r>
-            <a:r>
-              <a:rPr lang="en-US" dirty="0" smtClean="0"/>
-              <a:t>)</a:t>
-            </a:r>
-          </a:p>
-          <a:p>
+              <a:t>statsd</a:t>
+            </a:r>
             <a:endParaRPr lang="en-US" dirty="0"/>
           </a:p>
         </p:txBody>
@@ -5849,7 +5797,7 @@
     </p:spTree>
     <p:extLst>
       <p:ext uri="{BB962C8B-B14F-4D97-AF65-F5344CB8AC3E}">
-        <p14:creationId xmlns:p14="http://schemas.microsoft.com/office/powerpoint/2010/main" val="2361275417"/>
+        <p14:creationId xmlns:p14="http://schemas.microsoft.com/office/powerpoint/2010/main" val="1518226122"/>
       </p:ext>
     </p:extLst>
   </p:cSld>
@@ -5888,12 +5836,34 @@
         </p:nvSpPr>
         <p:spPr/>
         <p:txBody>
-          <a:bodyPr/>
-          <a:lstStyle/>
-          <a:p>
-            <a:r>
-              <a:rPr lang="en-US" dirty="0" smtClean="0"/>
-              <a:t>Application Monitoring</a:t>
+          <a:bodyPr>
+            <a:normAutofit fontScale="90000"/>
+          </a:bodyPr>
+          <a:lstStyle/>
+          <a:p>
+            <a:r>
+              <a:rPr lang="en-US" dirty="0"/>
+              <a:t>Building a </a:t>
+            </a:r>
+            <a:r>
+              <a:rPr lang="en-US" dirty="0" err="1"/>
+              <a:t>Docker</a:t>
+            </a:r>
+            <a:r>
+              <a:rPr lang="en-US" dirty="0"/>
+              <a:t> </a:t>
+            </a:r>
+            <a:r>
+              <a:rPr lang="en-US" dirty="0" smtClean="0"/>
+              <a:t>Host: Install </a:t>
+            </a:r>
+            <a:r>
+              <a:rPr lang="en-US" dirty="0" err="1" smtClean="0"/>
+              <a:t>Docker</a:t>
+            </a:r>
+            <a:r>
+              <a:rPr lang="en-US" dirty="0" smtClean="0"/>
+              <a:t>	</a:t>
             </a:r>
             <a:endParaRPr lang="en-US" dirty="0"/>
           </a:p>
@@ -5915,65 +5885,23 @@
           <a:lstStyle/>
           <a:p>
             <a:r>
+              <a:rPr lang="en-US" dirty="0" smtClean="0"/>
+              <a:t>Most distributions have a package in their repos</a:t>
+            </a:r>
+          </a:p>
+          <a:p>
+            <a:r>
+              <a:rPr lang="en-US" dirty="0" smtClean="0"/>
+              <a:t>Simply use </a:t>
+            </a:r>
+            <a:r>
               <a:rPr lang="en-US" dirty="0" err="1" smtClean="0"/>
-              <a:t>Statsd</a:t>
-            </a:r>
-            <a:endParaRPr lang="en-US" dirty="0" smtClean="0"/>
-          </a:p>
-          <a:p>
-            <a:pPr lvl="1"/>
-            <a:r>
-              <a:rPr lang="en-US" dirty="0" smtClean="0"/>
-              <a:t>Tool to let developers add quick metrics tracking to an app</a:t>
-            </a:r>
-          </a:p>
-          <a:p>
-            <a:pPr lvl="1"/>
-            <a:r>
-              <a:rPr lang="en-US" dirty="0" smtClean="0"/>
-              <a:t>Local daemon that runs, listening over </a:t>
-            </a:r>
-            <a:r>
-              <a:rPr lang="en-US" dirty="0" err="1" smtClean="0"/>
-              <a:t>udp</a:t>
-            </a:r>
-            <a:endParaRPr lang="en-US" dirty="0" smtClean="0"/>
-          </a:p>
-          <a:p>
-            <a:pPr lvl="1"/>
-            <a:r>
-              <a:rPr lang="en-US" dirty="0" smtClean="0"/>
-              <a:t>To track event developers push data to </a:t>
-            </a:r>
-            <a:r>
-              <a:rPr lang="en-US" dirty="0" err="1" smtClean="0"/>
-              <a:t>udp</a:t>
-            </a:r>
-            <a:r>
-              <a:rPr lang="en-US" dirty="0" smtClean="0"/>
-              <a:t> endpoint</a:t>
-            </a:r>
-          </a:p>
-          <a:p>
-            <a:pPr lvl="1"/>
-            <a:r>
-              <a:rPr lang="en-US" dirty="0" smtClean="0"/>
-              <a:t>Configure </a:t>
-            </a:r>
-            <a:r>
-              <a:rPr lang="en-US" dirty="0" err="1" smtClean="0"/>
-              <a:t>statsd</a:t>
-            </a:r>
-            <a:r>
-              <a:rPr lang="en-US" dirty="0" smtClean="0"/>
-              <a:t> to push metrics to centralized location</a:t>
-            </a:r>
-          </a:p>
-          <a:p>
-            <a:endParaRPr lang="en-US" dirty="0" smtClean="0"/>
-          </a:p>
-          <a:p>
-            <a:pPr lvl="1"/>
+              <a:t>ansible</a:t>
+            </a:r>
+            <a:r>
+              <a:rPr lang="en-US" dirty="0" smtClean="0"/>
+              <a:t> to install that package</a:t>
+            </a:r>
             <a:endParaRPr lang="en-US" dirty="0"/>
           </a:p>
         </p:txBody>
@@ -5981,7 +5909,7 @@
     </p:spTree>
     <p:extLst>
       <p:ext uri="{BB962C8B-B14F-4D97-AF65-F5344CB8AC3E}">
-        <p14:creationId xmlns:p14="http://schemas.microsoft.com/office/powerpoint/2010/main" val="2459741229"/>
+        <p14:creationId xmlns:p14="http://schemas.microsoft.com/office/powerpoint/2010/main" val="1515160663"/>
       </p:ext>
     </p:extLst>
   </p:cSld>
@@ -6076,12 +6004,9 @@
             </a:r>
           </a:p>
           <a:p>
-            <a:r>
-              <a:rPr lang="en-US" dirty="0" smtClean="0"/>
-              <a:t>Right now dealing with a 2 applications spread across 3 servers</a:t>
-            </a:r>
-          </a:p>
-          <a:p>
+            <a:pPr marL="0" indent="0">
+              <a:buNone/>
+            </a:pPr>
             <a:endParaRPr lang="en-US" dirty="0"/>
           </a:p>
         </p:txBody>
@@ -6128,105 +6053,119 @@
         </p:nvSpPr>
         <p:spPr/>
         <p:txBody>
-          <a:bodyPr/>
-          <a:lstStyle/>
-          <a:p>
-            <a:r>
-              <a:rPr lang="en-US" dirty="0" smtClean="0"/>
-              <a:t>Application Monitoring</a:t>
-            </a:r>
-            <a:endParaRPr lang="en-US" dirty="0"/>
-          </a:p>
-        </p:txBody>
-      </p:sp>
-      <p:sp>
-        <p:nvSpPr>
-          <p:cNvPr id="3" name="Content Placeholder 2"/>
-          <p:cNvSpPr>
-            <a:spLocks noGrp="1"/>
-          </p:cNvSpPr>
-          <p:nvPr>
-            <p:ph idx="1"/>
-          </p:nvPr>
-        </p:nvSpPr>
-        <p:spPr/>
-        <p:txBody>
-          <a:bodyPr/>
-          <a:lstStyle/>
-          <a:p>
-            <a:r>
-              <a:rPr lang="en-US" dirty="0" err="1" smtClean="0"/>
-              <a:t>Statsd</a:t>
-            </a:r>
-            <a:r>
-              <a:rPr lang="en-US" dirty="0" smtClean="0"/>
-              <a:t> with </a:t>
+          <a:bodyPr>
+            <a:normAutofit fontScale="90000"/>
+          </a:bodyPr>
+          <a:lstStyle/>
+          <a:p>
+            <a:r>
+              <a:rPr lang="en-US" dirty="0" smtClean="0"/>
+              <a:t>Building a </a:t>
             </a:r>
             <a:r>
               <a:rPr lang="en-US" dirty="0" err="1" smtClean="0"/>
               <a:t>Docker</a:t>
             </a:r>
-            <a:endParaRPr lang="en-US" dirty="0" smtClean="0"/>
+            <a:r>
+              <a:rPr lang="en-US" dirty="0" smtClean="0"/>
+              <a:t> Host: Reverse Proxy</a:t>
+            </a:r>
+            <a:endParaRPr lang="en-US" dirty="0"/>
+          </a:p>
+        </p:txBody>
+      </p:sp>
+      <p:sp>
+        <p:nvSpPr>
+          <p:cNvPr id="3" name="Content Placeholder 2"/>
+          <p:cNvSpPr>
+            <a:spLocks noGrp="1"/>
+          </p:cNvSpPr>
+          <p:nvPr>
+            <p:ph idx="1"/>
+          </p:nvPr>
+        </p:nvSpPr>
+        <p:spPr/>
+        <p:txBody>
+          <a:bodyPr>
+            <a:normAutofit fontScale="92500" lnSpcReduction="20000"/>
+          </a:bodyPr>
+          <a:lstStyle/>
+          <a:p>
+            <a:r>
+              <a:rPr lang="en-US" dirty="0" smtClean="0"/>
+              <a:t>Why?</a:t>
+            </a:r>
           </a:p>
           <a:p>
             <a:pPr lvl="1"/>
             <a:r>
               <a:rPr lang="en-US" dirty="0" smtClean="0"/>
-              <a:t>Create </a:t>
-            </a:r>
+              <a:t>Multiple containers on a single server, each a separate process</a:t>
+            </a:r>
+          </a:p>
+          <a:p>
+            <a:pPr lvl="1"/>
+            <a:r>
+              <a:rPr lang="en-US" dirty="0" smtClean="0"/>
+              <a:t>Can’t all listen to port 80 on the host</a:t>
+            </a:r>
+          </a:p>
+          <a:p>
+            <a:pPr lvl="1"/>
+            <a:r>
+              <a:rPr lang="en-US" dirty="0" smtClean="0"/>
+              <a:t>Setup single reverse proxy webserver which proxies requests to internal IPs for each container</a:t>
+            </a:r>
+          </a:p>
+          <a:p>
+            <a:r>
+              <a:rPr lang="en-US" dirty="0" smtClean="0"/>
+              <a:t>How?</a:t>
+            </a:r>
+          </a:p>
+          <a:p>
+            <a:pPr lvl="1"/>
             <a:r>
               <a:rPr lang="en-US" dirty="0" err="1" smtClean="0"/>
-              <a:t>statsd</a:t>
-            </a:r>
-            <a:r>
-              <a:rPr lang="en-US" dirty="0" smtClean="0"/>
-              <a:t> image with desired configuration</a:t>
+              <a:t>Nginx</a:t>
+            </a:r>
+            <a:r>
+              <a:rPr lang="en-US" dirty="0" smtClean="0"/>
+              <a:t> running in container</a:t>
             </a:r>
           </a:p>
           <a:p>
             <a:pPr lvl="1"/>
             <a:r>
-              <a:rPr lang="en-US" dirty="0" smtClean="0"/>
-              <a:t>Start on every host, listening at a given port</a:t>
+              <a:rPr lang="en-US" dirty="0" err="1" smtClean="0"/>
+              <a:t>Docker</a:t>
+            </a:r>
+            <a:r>
+              <a:rPr lang="en-US" dirty="0" smtClean="0"/>
+              <a:t> gen in linked container</a:t>
             </a:r>
           </a:p>
           <a:p>
             <a:pPr lvl="1"/>
             <a:r>
-              <a:rPr lang="en-US" dirty="0" smtClean="0"/>
-              <a:t>When starting app containers, check if </a:t>
-            </a:r>
-            <a:r>
               <a:rPr lang="en-US" dirty="0" err="1" smtClean="0"/>
-              <a:t>statsd</a:t>
-            </a:r>
-            <a:r>
-              <a:rPr lang="en-US" dirty="0" smtClean="0"/>
-              <a:t> container is running</a:t>
+              <a:t>Docker</a:t>
+            </a:r>
+            <a:r>
+              <a:rPr lang="en-US" dirty="0" smtClean="0"/>
+              <a:t> gen dynamically creates </a:t>
+            </a:r>
+            <a:r>
+              <a:rPr lang="en-US" dirty="0" err="1" smtClean="0"/>
+              <a:t>nginx</a:t>
+            </a:r>
+            <a:r>
+              <a:rPr lang="en-US" dirty="0" smtClean="0"/>
+              <a:t> configuration file with proper reverse proxy settings</a:t>
             </a:r>
           </a:p>
           <a:p>
             <a:pPr lvl="1"/>
-            <a:r>
-              <a:rPr lang="en-US" dirty="0" smtClean="0"/>
-              <a:t>If yes, then link </a:t>
-            </a:r>
-            <a:r>
-              <a:rPr lang="en-US" dirty="0" err="1" smtClean="0"/>
-              <a:t>statsd</a:t>
-            </a:r>
-            <a:r>
-              <a:rPr lang="en-US" dirty="0" smtClean="0"/>
-              <a:t> container to app container, then app can discover IP and port to push </a:t>
-            </a:r>
-            <a:r>
-              <a:rPr lang="en-US" dirty="0" err="1" smtClean="0"/>
-              <a:t>statsd</a:t>
-            </a:r>
-            <a:r>
-              <a:rPr lang="en-US" dirty="0" smtClean="0"/>
-              <a:t> messages to.</a:t>
-            </a:r>
             <a:endParaRPr lang="en-US" dirty="0"/>
           </a:p>
         </p:txBody>
@@ -6234,7 +6173,7 @@
     </p:spTree>
     <p:extLst>
       <p:ext uri="{BB962C8B-B14F-4D97-AF65-F5344CB8AC3E}">
-        <p14:creationId xmlns:p14="http://schemas.microsoft.com/office/powerpoint/2010/main" val="395592667"/>
+        <p14:creationId xmlns:p14="http://schemas.microsoft.com/office/powerpoint/2010/main" val="3394323431"/>
       </p:ext>
     </p:extLst>
   </p:cSld>
@@ -6274,13 +6213,21 @@
         <p:spPr/>
         <p:txBody>
           <a:bodyPr>
-            <a:normAutofit/>
+            <a:normAutofit fontScale="90000"/>
           </a:bodyPr>
           <a:lstStyle/>
           <a:p>
             <a:r>
               <a:rPr lang="en-US" dirty="0" smtClean="0"/>
-              <a:t>What I didn’t cover</a:t>
+              <a:t>Building a </a:t>
+            </a:r>
+            <a:r>
+              <a:rPr lang="en-US" dirty="0" err="1" smtClean="0"/>
+              <a:t>Docker</a:t>
+            </a:r>
+            <a:r>
+              <a:rPr lang="en-US" dirty="0" smtClean="0"/>
+              <a:t> Host: Centralized Logging</a:t>
             </a:r>
             <a:endParaRPr lang="en-US" dirty="0"/>
           </a:p>
@@ -6299,32 +6246,51 @@
         <p:spPr/>
         <p:txBody>
           <a:bodyPr>
-            <a:normAutofit fontScale="92500" lnSpcReduction="10000"/>
+            <a:normAutofit fontScale="85000" lnSpcReduction="10000"/>
           </a:bodyPr>
           <a:lstStyle/>
           <a:p>
+            <a:r>
+              <a:rPr lang="en-US" dirty="0" smtClean="0"/>
+              <a:t>Out of the box</a:t>
+            </a:r>
+          </a:p>
+          <a:p>
             <a:pPr lvl="1"/>
             <a:r>
+              <a:rPr lang="en-US" dirty="0" smtClean="0"/>
+              <a:t>Inside container, apps should just log everything to </a:t>
+            </a:r>
+            <a:r>
               <a:rPr lang="en-US" dirty="0" err="1" smtClean="0"/>
-              <a:t>Dockerfile</a:t>
-            </a:r>
-            <a:r>
-              <a:rPr lang="en-US" dirty="0" smtClean="0"/>
-              <a:t> best practices</a:t>
-            </a:r>
-          </a:p>
-          <a:p>
-            <a:pPr lvl="2"/>
-            <a:r>
-              <a:rPr lang="en-US" dirty="0" smtClean="0"/>
-              <a:t>Caching</a:t>
-            </a:r>
+              <a:t>stdout</a:t>
+            </a:r>
+            <a:endParaRPr lang="en-US" dirty="0" smtClean="0"/>
           </a:p>
           <a:p>
             <a:pPr lvl="1"/>
             <a:r>
-              <a:rPr lang="en-US" dirty="0" smtClean="0"/>
-              <a:t>Inspecting running </a:t>
+              <a:rPr lang="en-US" dirty="0" err="1" smtClean="0"/>
+              <a:t>Docker</a:t>
+            </a:r>
+            <a:r>
+              <a:rPr lang="en-US" dirty="0" smtClean="0"/>
+              <a:t> redirects </a:t>
+            </a:r>
+            <a:r>
+              <a:rPr lang="en-US" dirty="0" err="1" smtClean="0"/>
+              <a:t>stdout</a:t>
+            </a:r>
+            <a:r>
+              <a:rPr lang="en-US" dirty="0" smtClean="0"/>
+              <a:t> to log files for each container</a:t>
+            </a:r>
+          </a:p>
+          <a:p>
+            <a:pPr lvl="1"/>
+            <a:r>
+              <a:rPr lang="en-US" dirty="0" smtClean="0"/>
+              <a:t>Can read via </a:t>
             </a:r>
             <a:r>
               <a:rPr lang="en-US" dirty="0" err="1" smtClean="0"/>
@@ -6332,23 +6298,29 @@
             </a:r>
             <a:r>
               <a:rPr lang="en-US" dirty="0" smtClean="0"/>
-              <a:t> containers</a:t>
+              <a:t> logs</a:t>
             </a:r>
           </a:p>
           <a:p>
             <a:pPr lvl="1"/>
             <a:r>
               <a:rPr lang="en-US" dirty="0" smtClean="0"/>
-              <a:t>Ad hoc </a:t>
-            </a:r>
+              <a:t>Log files grow unbounded (yikes!)</a:t>
+            </a:r>
+          </a:p>
+          <a:p>
+            <a:r>
+              <a:rPr lang="en-US" dirty="0" smtClean="0"/>
+              <a:t>Best practice</a:t>
+            </a:r>
+          </a:p>
+          <a:p>
+            <a:pPr lvl="1"/>
             <a:r>
               <a:rPr lang="en-US" dirty="0" err="1" smtClean="0"/>
-              <a:t>docker</a:t>
-            </a:r>
-            <a:r>
-              <a:rPr lang="en-US" dirty="0" smtClean="0"/>
-              <a:t> containers</a:t>
-            </a:r>
+              <a:t>Logspout</a:t>
+            </a:r>
+            <a:endParaRPr lang="en-US" dirty="0" smtClean="0"/>
           </a:p>
           <a:p>
             <a:pPr lvl="1"/>
@@ -6358,71 +6330,41 @@
             </a:r>
             <a:r>
               <a:rPr lang="en-US" dirty="0" smtClean="0"/>
-              <a:t> repositories and image management</a:t>
+              <a:t> container which can redirect logs to wherever you need them</a:t>
             </a:r>
           </a:p>
           <a:p>
             <a:pPr lvl="1"/>
             <a:r>
+              <a:rPr lang="en-US" dirty="0" smtClean="0"/>
+              <a:t>Send over UDP to logging service (</a:t>
+            </a:r>
+            <a:r>
               <a:rPr lang="en-US" dirty="0" err="1" smtClean="0"/>
-              <a:t>Ansible</a:t>
-            </a:r>
-            <a:r>
-              <a:rPr lang="en-US" dirty="0" smtClean="0"/>
-              <a:t> reusability</a:t>
-            </a:r>
-          </a:p>
-          <a:p>
-            <a:pPr lvl="2"/>
+              <a:t>Papertrail</a:t>
+            </a:r>
+            <a:r>
+              <a:rPr lang="en-US" dirty="0" smtClean="0"/>
+              <a:t>, </a:t>
+            </a:r>
             <a:r>
               <a:rPr lang="en-US" dirty="0" err="1" smtClean="0"/>
-              <a:t>Ansible</a:t>
-            </a:r>
-            <a:r>
-              <a:rPr lang="en-US" dirty="0" smtClean="0"/>
-              <a:t>-galaxy</a:t>
-            </a:r>
-          </a:p>
-          <a:p>
-            <a:pPr lvl="1"/>
-            <a:r>
-              <a:rPr lang="en-US" dirty="0" smtClean="0"/>
-              <a:t>Ad hoc </a:t>
+              <a:t>loggly</a:t>
+            </a:r>
+            <a:r>
+              <a:rPr lang="en-US" dirty="0" smtClean="0"/>
+              <a:t>, </a:t>
             </a:r>
             <a:r>
               <a:rPr lang="en-US" dirty="0" err="1" smtClean="0"/>
-              <a:t>ansible</a:t>
-            </a:r>
-            <a:r>
-              <a:rPr lang="en-US" dirty="0" smtClean="0"/>
-              <a:t> commands</a:t>
-            </a:r>
-          </a:p>
-          <a:p>
-            <a:pPr lvl="1"/>
-            <a:r>
-              <a:rPr lang="en-US" dirty="0" smtClean="0"/>
-              <a:t>Custom </a:t>
-            </a:r>
-            <a:r>
-              <a:rPr lang="en-US" dirty="0" err="1" smtClean="0"/>
-              <a:t>ansible</a:t>
-            </a:r>
-            <a:r>
-              <a:rPr lang="en-US" dirty="0" smtClean="0"/>
-              <a:t> modules</a:t>
-            </a:r>
-          </a:p>
-          <a:p>
-            <a:pPr lvl="1"/>
-            <a:r>
-              <a:rPr lang="en-US" dirty="0" err="1" smtClean="0"/>
-              <a:t>Ansible</a:t>
-            </a:r>
-            <a:r>
-              <a:rPr lang="en-US" dirty="0" smtClean="0"/>
-              <a:t> playbook best practices</a:t>
-            </a:r>
+              <a:t>etc</a:t>
+            </a:r>
+            <a:r>
+              <a:rPr lang="en-US" dirty="0" smtClean="0"/>
+              <a:t>)</a:t>
+            </a:r>
+          </a:p>
+          <a:p>
             <a:endParaRPr lang="en-US" dirty="0"/>
           </a:p>
         </p:txBody>
@@ -6430,7 +6372,7 @@
     </p:spTree>
     <p:extLst>
       <p:ext uri="{BB962C8B-B14F-4D97-AF65-F5344CB8AC3E}">
-        <p14:creationId xmlns:p14="http://schemas.microsoft.com/office/powerpoint/2010/main" val="902536219"/>
+        <p14:creationId xmlns:p14="http://schemas.microsoft.com/office/powerpoint/2010/main" val="2361275417"/>
       </p:ext>
     </p:extLst>
   </p:cSld>
@@ -6441,6 +6383,475 @@
 </file>
 
 <file path=ppt/slides/slide22.xml><?xml version="1.0" encoding="utf-8"?>
+<p:sld xmlns:a="http://schemas.openxmlformats.org/drawingml/2006/main" xmlns:r="http://schemas.openxmlformats.org/officeDocument/2006/relationships" xmlns:p="http://schemas.openxmlformats.org/presentationml/2006/main">
+  <p:cSld>
+    <p:spTree>
+      <p:nvGrpSpPr>
+        <p:cNvPr id="1" name=""/>
+        <p:cNvGrpSpPr/>
+        <p:nvPr/>
+      </p:nvGrpSpPr>
+      <p:grpSpPr>
+        <a:xfrm>
+          <a:off x="0" y="0"/>
+          <a:ext cx="0" cy="0"/>
+          <a:chOff x="0" y="0"/>
+          <a:chExt cx="0" cy="0"/>
+        </a:xfrm>
+      </p:grpSpPr>
+      <p:sp>
+        <p:nvSpPr>
+          <p:cNvPr id="2" name="Title 1"/>
+          <p:cNvSpPr>
+            <a:spLocks noGrp="1"/>
+          </p:cNvSpPr>
+          <p:nvPr>
+            <p:ph type="title"/>
+          </p:nvPr>
+        </p:nvSpPr>
+        <p:spPr/>
+        <p:txBody>
+          <a:bodyPr>
+            <a:normAutofit fontScale="90000"/>
+          </a:bodyPr>
+          <a:lstStyle/>
+          <a:p>
+            <a:r>
+              <a:rPr lang="en-US" dirty="0"/>
+              <a:t>Building a </a:t>
+            </a:r>
+            <a:r>
+              <a:rPr lang="en-US" dirty="0" err="1"/>
+              <a:t>Docker</a:t>
+            </a:r>
+            <a:r>
+              <a:rPr lang="en-US" dirty="0"/>
+              <a:t> </a:t>
+            </a:r>
+            <a:r>
+              <a:rPr lang="en-US" dirty="0" smtClean="0"/>
+              <a:t>Host: Application </a:t>
+            </a:r>
+            <a:r>
+              <a:rPr lang="en-US" dirty="0" smtClean="0"/>
+              <a:t>Monitoring</a:t>
+            </a:r>
+            <a:endParaRPr lang="en-US" dirty="0"/>
+          </a:p>
+        </p:txBody>
+      </p:sp>
+      <p:sp>
+        <p:nvSpPr>
+          <p:cNvPr id="3" name="Content Placeholder 2"/>
+          <p:cNvSpPr>
+            <a:spLocks noGrp="1"/>
+          </p:cNvSpPr>
+          <p:nvPr>
+            <p:ph idx="1"/>
+          </p:nvPr>
+        </p:nvSpPr>
+        <p:spPr/>
+        <p:txBody>
+          <a:bodyPr/>
+          <a:lstStyle/>
+          <a:p>
+            <a:r>
+              <a:rPr lang="en-US" dirty="0" err="1" smtClean="0"/>
+              <a:t>Statsd</a:t>
+            </a:r>
+            <a:endParaRPr lang="en-US" dirty="0" smtClean="0"/>
+          </a:p>
+          <a:p>
+            <a:pPr lvl="1"/>
+            <a:r>
+              <a:rPr lang="en-US" dirty="0" smtClean="0"/>
+              <a:t>Tool to let developers add quick metrics tracking to an app</a:t>
+            </a:r>
+          </a:p>
+          <a:p>
+            <a:pPr lvl="1"/>
+            <a:r>
+              <a:rPr lang="en-US" dirty="0" smtClean="0"/>
+              <a:t>Local daemon that runs, listening over </a:t>
+            </a:r>
+            <a:r>
+              <a:rPr lang="en-US" dirty="0" err="1" smtClean="0"/>
+              <a:t>udp</a:t>
+            </a:r>
+            <a:endParaRPr lang="en-US" dirty="0" smtClean="0"/>
+          </a:p>
+          <a:p>
+            <a:pPr lvl="1"/>
+            <a:r>
+              <a:rPr lang="en-US" dirty="0" smtClean="0"/>
+              <a:t>To track event developers push data to </a:t>
+            </a:r>
+            <a:r>
+              <a:rPr lang="en-US" dirty="0" err="1" smtClean="0"/>
+              <a:t>udp</a:t>
+            </a:r>
+            <a:r>
+              <a:rPr lang="en-US" dirty="0" smtClean="0"/>
+              <a:t> endpoint</a:t>
+            </a:r>
+          </a:p>
+          <a:p>
+            <a:pPr lvl="1"/>
+            <a:r>
+              <a:rPr lang="en-US" dirty="0" smtClean="0"/>
+              <a:t>Configure </a:t>
+            </a:r>
+            <a:r>
+              <a:rPr lang="en-US" dirty="0" err="1" smtClean="0"/>
+              <a:t>statsd</a:t>
+            </a:r>
+            <a:r>
+              <a:rPr lang="en-US" dirty="0" smtClean="0"/>
+              <a:t> to push metrics to centralized location</a:t>
+            </a:r>
+          </a:p>
+          <a:p>
+            <a:endParaRPr lang="en-US" dirty="0" smtClean="0"/>
+          </a:p>
+          <a:p>
+            <a:pPr lvl="1"/>
+            <a:endParaRPr lang="en-US" dirty="0"/>
+          </a:p>
+        </p:txBody>
+      </p:sp>
+    </p:spTree>
+    <p:extLst>
+      <p:ext uri="{BB962C8B-B14F-4D97-AF65-F5344CB8AC3E}">
+        <p14:creationId xmlns:p14="http://schemas.microsoft.com/office/powerpoint/2010/main" val="2459741229"/>
+      </p:ext>
+    </p:extLst>
+  </p:cSld>
+  <p:clrMapOvr>
+    <a:masterClrMapping/>
+  </p:clrMapOvr>
+</p:sld>
+</file>
+
+<file path=ppt/slides/slide23.xml><?xml version="1.0" encoding="utf-8"?>
+<p:sld xmlns:a="http://schemas.openxmlformats.org/drawingml/2006/main" xmlns:r="http://schemas.openxmlformats.org/officeDocument/2006/relationships" xmlns:p="http://schemas.openxmlformats.org/presentationml/2006/main">
+  <p:cSld>
+    <p:spTree>
+      <p:nvGrpSpPr>
+        <p:cNvPr id="1" name=""/>
+        <p:cNvGrpSpPr/>
+        <p:nvPr/>
+      </p:nvGrpSpPr>
+      <p:grpSpPr>
+        <a:xfrm>
+          <a:off x="0" y="0"/>
+          <a:ext cx="0" cy="0"/>
+          <a:chOff x="0" y="0"/>
+          <a:chExt cx="0" cy="0"/>
+        </a:xfrm>
+      </p:grpSpPr>
+      <p:sp>
+        <p:nvSpPr>
+          <p:cNvPr id="2" name="Title 1"/>
+          <p:cNvSpPr>
+            <a:spLocks noGrp="1"/>
+          </p:cNvSpPr>
+          <p:nvPr>
+            <p:ph type="title"/>
+          </p:nvPr>
+        </p:nvSpPr>
+        <p:spPr/>
+        <p:txBody>
+          <a:bodyPr/>
+          <a:lstStyle/>
+          <a:p>
+            <a:r>
+              <a:rPr lang="en-US" dirty="0" smtClean="0"/>
+              <a:t>Application Monitoring</a:t>
+            </a:r>
+            <a:endParaRPr lang="en-US" dirty="0"/>
+          </a:p>
+        </p:txBody>
+      </p:sp>
+      <p:sp>
+        <p:nvSpPr>
+          <p:cNvPr id="3" name="Content Placeholder 2"/>
+          <p:cNvSpPr>
+            <a:spLocks noGrp="1"/>
+          </p:cNvSpPr>
+          <p:nvPr>
+            <p:ph idx="1"/>
+          </p:nvPr>
+        </p:nvSpPr>
+        <p:spPr/>
+        <p:txBody>
+          <a:bodyPr/>
+          <a:lstStyle/>
+          <a:p>
+            <a:r>
+              <a:rPr lang="en-US" dirty="0" err="1" smtClean="0"/>
+              <a:t>Statsd</a:t>
+            </a:r>
+            <a:r>
+              <a:rPr lang="en-US" dirty="0" smtClean="0"/>
+              <a:t> with </a:t>
+            </a:r>
+            <a:r>
+              <a:rPr lang="en-US" dirty="0" err="1" smtClean="0"/>
+              <a:t>Docker</a:t>
+            </a:r>
+            <a:endParaRPr lang="en-US" dirty="0" smtClean="0"/>
+          </a:p>
+          <a:p>
+            <a:pPr lvl="1"/>
+            <a:r>
+              <a:rPr lang="en-US" dirty="0" smtClean="0"/>
+              <a:t>Create </a:t>
+            </a:r>
+            <a:r>
+              <a:rPr lang="en-US" dirty="0" err="1" smtClean="0"/>
+              <a:t>statsd</a:t>
+            </a:r>
+            <a:r>
+              <a:rPr lang="en-US" dirty="0" smtClean="0"/>
+              <a:t> image with desired configuration</a:t>
+            </a:r>
+          </a:p>
+          <a:p>
+            <a:pPr lvl="1"/>
+            <a:r>
+              <a:rPr lang="en-US" dirty="0" smtClean="0"/>
+              <a:t>Start on every host, listening at a given port</a:t>
+            </a:r>
+          </a:p>
+          <a:p>
+            <a:pPr lvl="1"/>
+            <a:r>
+              <a:rPr lang="en-US" dirty="0" smtClean="0"/>
+              <a:t>When starting app containers, check if </a:t>
+            </a:r>
+            <a:r>
+              <a:rPr lang="en-US" dirty="0" err="1" smtClean="0"/>
+              <a:t>statsd</a:t>
+            </a:r>
+            <a:r>
+              <a:rPr lang="en-US" dirty="0" smtClean="0"/>
+              <a:t> container is running</a:t>
+            </a:r>
+          </a:p>
+          <a:p>
+            <a:pPr lvl="1"/>
+            <a:r>
+              <a:rPr lang="en-US" dirty="0" smtClean="0"/>
+              <a:t>If yes, then link </a:t>
+            </a:r>
+            <a:r>
+              <a:rPr lang="en-US" dirty="0" err="1" smtClean="0"/>
+              <a:t>statsd</a:t>
+            </a:r>
+            <a:r>
+              <a:rPr lang="en-US" dirty="0" smtClean="0"/>
+              <a:t> container to app container, then app can discover IP and port to push </a:t>
+            </a:r>
+            <a:r>
+              <a:rPr lang="en-US" dirty="0" err="1" smtClean="0"/>
+              <a:t>statsd</a:t>
+            </a:r>
+            <a:r>
+              <a:rPr lang="en-US" dirty="0" smtClean="0"/>
+              <a:t> messages to.</a:t>
+            </a:r>
+            <a:endParaRPr lang="en-US" dirty="0"/>
+          </a:p>
+        </p:txBody>
+      </p:sp>
+    </p:spTree>
+    <p:extLst>
+      <p:ext uri="{BB962C8B-B14F-4D97-AF65-F5344CB8AC3E}">
+        <p14:creationId xmlns:p14="http://schemas.microsoft.com/office/powerpoint/2010/main" val="395592667"/>
+      </p:ext>
+    </p:extLst>
+  </p:cSld>
+  <p:clrMapOvr>
+    <a:masterClrMapping/>
+  </p:clrMapOvr>
+</p:sld>
+</file>
+
+<file path=ppt/slides/slide24.xml><?xml version="1.0" encoding="utf-8"?>
+<p:sld xmlns:a="http://schemas.openxmlformats.org/drawingml/2006/main" xmlns:r="http://schemas.openxmlformats.org/officeDocument/2006/relationships" xmlns:p="http://schemas.openxmlformats.org/presentationml/2006/main">
+  <p:cSld>
+    <p:spTree>
+      <p:nvGrpSpPr>
+        <p:cNvPr id="1" name=""/>
+        <p:cNvGrpSpPr/>
+        <p:nvPr/>
+      </p:nvGrpSpPr>
+      <p:grpSpPr>
+        <a:xfrm>
+          <a:off x="0" y="0"/>
+          <a:ext cx="0" cy="0"/>
+          <a:chOff x="0" y="0"/>
+          <a:chExt cx="0" cy="0"/>
+        </a:xfrm>
+      </p:grpSpPr>
+      <p:sp>
+        <p:nvSpPr>
+          <p:cNvPr id="2" name="Title 1"/>
+          <p:cNvSpPr>
+            <a:spLocks noGrp="1"/>
+          </p:cNvSpPr>
+          <p:nvPr>
+            <p:ph type="title"/>
+          </p:nvPr>
+        </p:nvSpPr>
+        <p:spPr/>
+        <p:txBody>
+          <a:bodyPr/>
+          <a:lstStyle/>
+          <a:p>
+            <a:r>
+              <a:rPr lang="en-US" dirty="0" smtClean="0"/>
+              <a:t>Conclusion</a:t>
+            </a:r>
+            <a:endParaRPr lang="en-US" dirty="0"/>
+          </a:p>
+        </p:txBody>
+      </p:sp>
+      <p:sp>
+        <p:nvSpPr>
+          <p:cNvPr id="3" name="Content Placeholder 2"/>
+          <p:cNvSpPr>
+            <a:spLocks noGrp="1"/>
+          </p:cNvSpPr>
+          <p:nvPr>
+            <p:ph idx="1"/>
+          </p:nvPr>
+        </p:nvSpPr>
+        <p:spPr/>
+        <p:txBody>
+          <a:bodyPr>
+            <a:normAutofit fontScale="85000" lnSpcReduction="10000"/>
+          </a:bodyPr>
+          <a:lstStyle/>
+          <a:p>
+            <a:r>
+              <a:rPr lang="en-US" dirty="0" smtClean="0"/>
+              <a:t>Final architecture</a:t>
+            </a:r>
+          </a:p>
+          <a:p>
+            <a:pPr lvl="1"/>
+            <a:r>
+              <a:rPr lang="en-US" dirty="0" smtClean="0"/>
+              <a:t>Host running </a:t>
+            </a:r>
+            <a:r>
+              <a:rPr lang="en-US" dirty="0" err="1" smtClean="0"/>
+              <a:t>docker</a:t>
+            </a:r>
+            <a:endParaRPr lang="en-US" dirty="0" smtClean="0"/>
+          </a:p>
+          <a:p>
+            <a:pPr lvl="1"/>
+            <a:r>
+              <a:rPr lang="en-US" dirty="0" smtClean="0"/>
+              <a:t>Reverse proxy that forwards requests to individual containers</a:t>
+            </a:r>
+          </a:p>
+          <a:p>
+            <a:pPr lvl="1"/>
+            <a:r>
+              <a:rPr lang="en-US" dirty="0" smtClean="0"/>
+              <a:t>Each container built up and deployed from </a:t>
+            </a:r>
+            <a:r>
+              <a:rPr lang="en-US" dirty="0" err="1" smtClean="0"/>
+              <a:t>docker</a:t>
+            </a:r>
+            <a:r>
+              <a:rPr lang="en-US" dirty="0" smtClean="0"/>
+              <a:t> file</a:t>
+            </a:r>
+          </a:p>
+          <a:p>
+            <a:pPr lvl="1"/>
+            <a:r>
+              <a:rPr lang="en-US" dirty="0" smtClean="0"/>
+              <a:t>Common concerns like logging and monitoring handled by services in containers</a:t>
+            </a:r>
+          </a:p>
+          <a:p>
+            <a:r>
+              <a:rPr lang="en-US" dirty="0" smtClean="0"/>
+              <a:t>Clean separation of concerns</a:t>
+            </a:r>
+          </a:p>
+          <a:p>
+            <a:pPr lvl="1"/>
+            <a:r>
+              <a:rPr lang="en-US" b="1" dirty="0" smtClean="0"/>
+              <a:t>DEV</a:t>
+            </a:r>
+            <a:r>
+              <a:rPr lang="en-US" dirty="0"/>
+              <a:t>: Specific configuration for apps done inside </a:t>
+            </a:r>
+            <a:r>
+              <a:rPr lang="en-US" dirty="0" err="1"/>
+              <a:t>dockerfile</a:t>
+            </a:r>
+            <a:endParaRPr lang="en-US" dirty="0"/>
+          </a:p>
+          <a:p>
+            <a:pPr lvl="1"/>
+            <a:r>
+              <a:rPr lang="en-US" b="1" dirty="0"/>
+              <a:t>OPS</a:t>
+            </a:r>
+            <a:r>
+              <a:rPr lang="en-US" dirty="0"/>
+              <a:t>: Common Configuration for hosts done inside </a:t>
+            </a:r>
+            <a:r>
+              <a:rPr lang="en-US" dirty="0" err="1"/>
+              <a:t>ansible</a:t>
+            </a:r>
+            <a:endParaRPr lang="en-US" dirty="0"/>
+          </a:p>
+          <a:p>
+            <a:pPr marL="457200" lvl="1" indent="0">
+              <a:buNone/>
+            </a:pPr>
+            <a:endParaRPr lang="en-US" dirty="0" smtClean="0"/>
+          </a:p>
+          <a:p>
+            <a:pPr marL="457200" lvl="1" indent="0">
+              <a:buNone/>
+            </a:pPr>
+            <a:endParaRPr lang="en-US" dirty="0" smtClean="0"/>
+          </a:p>
+          <a:p>
+            <a:pPr marL="0" indent="0">
+              <a:buNone/>
+            </a:pPr>
+            <a:endParaRPr lang="en-US" dirty="0"/>
+          </a:p>
+        </p:txBody>
+      </p:sp>
+    </p:spTree>
+    <p:extLst>
+      <p:ext uri="{BB962C8B-B14F-4D97-AF65-F5344CB8AC3E}">
+        <p14:creationId xmlns:p14="http://schemas.microsoft.com/office/powerpoint/2010/main" val="1275007925"/>
+      </p:ext>
+    </p:extLst>
+  </p:cSld>
+  <p:clrMapOvr>
+    <a:masterClrMapping/>
+  </p:clrMapOvr>
+</p:sld>
+</file>
+
+<file path=ppt/slides/slide25.xml><?xml version="1.0" encoding="utf-8"?>
 <p:sld xmlns:a="http://schemas.openxmlformats.org/drawingml/2006/main" xmlns:r="http://schemas.openxmlformats.org/officeDocument/2006/relationships" xmlns:p="http://schemas.openxmlformats.org/presentationml/2006/main">
   <p:cSld>
     <p:spTree>
@@ -6546,6 +6957,114 @@
           <a:p>
             <a:r>
               <a:rPr lang="en-US" dirty="0" smtClean="0"/>
+              <a:t>What am I talking about	</a:t>
+            </a:r>
+            <a:endParaRPr lang="en-US" dirty="0"/>
+          </a:p>
+        </p:txBody>
+      </p:sp>
+      <p:sp>
+        <p:nvSpPr>
+          <p:cNvPr id="3" name="Content Placeholder 2"/>
+          <p:cNvSpPr>
+            <a:spLocks noGrp="1"/>
+          </p:cNvSpPr>
+          <p:nvPr>
+            <p:ph idx="1"/>
+          </p:nvPr>
+        </p:nvSpPr>
+        <p:spPr/>
+        <p:txBody>
+          <a:bodyPr/>
+          <a:lstStyle/>
+          <a:p>
+            <a:r>
+              <a:rPr lang="en-US" dirty="0" smtClean="0"/>
+              <a:t>Going over the basic structure of the solution we’re using for 2 applications across 3 servers</a:t>
+            </a:r>
+          </a:p>
+          <a:p>
+            <a:r>
+              <a:rPr lang="en-US" dirty="0" smtClean="0"/>
+              <a:t>Presentation will be high level, not going to show every implementation detail</a:t>
+            </a:r>
+          </a:p>
+          <a:p>
+            <a:r>
+              <a:rPr lang="en-US" dirty="0" smtClean="0"/>
+              <a:t>Sample </a:t>
+            </a:r>
+            <a:r>
+              <a:rPr lang="en-US" dirty="0"/>
+              <a:t>project available at </a:t>
+            </a:r>
+            <a:r>
+              <a:rPr lang="en-US" dirty="0">
+                <a:hlinkClick r:id="rId2"/>
+              </a:rPr>
+              <a:t>https://github.com/AndrewSwerlick/docker-</a:t>
+            </a:r>
+            <a:r>
+              <a:rPr lang="en-US" dirty="0" smtClean="0">
+                <a:hlinkClick r:id="rId2"/>
+              </a:rPr>
+              <a:t>talk</a:t>
+            </a:r>
+            <a:r>
+              <a:rPr lang="en-US" dirty="0" smtClean="0"/>
+              <a:t> for those who are interested</a:t>
+            </a:r>
+            <a:endParaRPr lang="en-US" dirty="0"/>
+          </a:p>
+        </p:txBody>
+      </p:sp>
+    </p:spTree>
+    <p:extLst>
+      <p:ext uri="{BB962C8B-B14F-4D97-AF65-F5344CB8AC3E}">
+        <p14:creationId xmlns:p14="http://schemas.microsoft.com/office/powerpoint/2010/main" val="3246270482"/>
+      </p:ext>
+    </p:extLst>
+  </p:cSld>
+  <p:clrMapOvr>
+    <a:masterClrMapping/>
+  </p:clrMapOvr>
+</p:sld>
+</file>
+
+<file path=ppt/slides/slide4.xml><?xml version="1.0" encoding="utf-8"?>
+<p:sld xmlns:a="http://schemas.openxmlformats.org/drawingml/2006/main" xmlns:r="http://schemas.openxmlformats.org/officeDocument/2006/relationships" xmlns:p="http://schemas.openxmlformats.org/presentationml/2006/main">
+  <p:cSld>
+    <p:spTree>
+      <p:nvGrpSpPr>
+        <p:cNvPr id="1" name=""/>
+        <p:cNvGrpSpPr/>
+        <p:nvPr/>
+      </p:nvGrpSpPr>
+      <p:grpSpPr>
+        <a:xfrm>
+          <a:off x="0" y="0"/>
+          <a:ext cx="0" cy="0"/>
+          <a:chOff x="0" y="0"/>
+          <a:chExt cx="0" cy="0"/>
+        </a:xfrm>
+      </p:grpSpPr>
+      <p:sp>
+        <p:nvSpPr>
+          <p:cNvPr id="2" name="Title 1"/>
+          <p:cNvSpPr>
+            <a:spLocks noGrp="1"/>
+          </p:cNvSpPr>
+          <p:nvPr>
+            <p:ph type="title"/>
+          </p:nvPr>
+        </p:nvSpPr>
+        <p:spPr/>
+        <p:txBody>
+          <a:bodyPr/>
+          <a:lstStyle/>
+          <a:p>
+            <a:r>
+              <a:rPr lang="en-US" dirty="0" smtClean="0"/>
               <a:t>Solution	</a:t>
             </a:r>
             <a:endParaRPr lang="en-US" dirty="0"/>
@@ -6714,7 +7233,7 @@
 </p:sld>
 </file>
 
-<file path=ppt/slides/slide4.xml><?xml version="1.0" encoding="utf-8"?>
+<file path=ppt/slides/slide5.xml><?xml version="1.0" encoding="utf-8"?>
 <p:sld xmlns:a="http://schemas.openxmlformats.org/drawingml/2006/main" xmlns:r="http://schemas.openxmlformats.org/officeDocument/2006/relationships" xmlns:p="http://schemas.openxmlformats.org/presentationml/2006/main">
   <p:cSld>
     <p:spTree>
@@ -6835,91 +7354,6 @@
 </p:sld>
 </file>
 
-<file path=ppt/slides/slide5.xml><?xml version="1.0" encoding="utf-8"?>
-<p:sld xmlns:a="http://schemas.openxmlformats.org/drawingml/2006/main" xmlns:r="http://schemas.openxmlformats.org/officeDocument/2006/relationships" xmlns:p="http://schemas.openxmlformats.org/presentationml/2006/main">
-  <p:cSld>
-    <p:spTree>
-      <p:nvGrpSpPr>
-        <p:cNvPr id="1" name=""/>
-        <p:cNvGrpSpPr/>
-        <p:nvPr/>
-      </p:nvGrpSpPr>
-      <p:grpSpPr>
-        <a:xfrm>
-          <a:off x="0" y="0"/>
-          <a:ext cx="0" cy="0"/>
-          <a:chOff x="0" y="0"/>
-          <a:chExt cx="0" cy="0"/>
-        </a:xfrm>
-      </p:grpSpPr>
-      <p:sp>
-        <p:nvSpPr>
-          <p:cNvPr id="2" name="Title 1"/>
-          <p:cNvSpPr>
-            <a:spLocks noGrp="1"/>
-          </p:cNvSpPr>
-          <p:nvPr>
-            <p:ph type="title"/>
-          </p:nvPr>
-        </p:nvSpPr>
-        <p:spPr/>
-        <p:txBody>
-          <a:bodyPr/>
-          <a:lstStyle/>
-          <a:p>
-            <a:r>
-              <a:rPr lang="en-US" dirty="0" err="1" smtClean="0"/>
-              <a:t>Ansible</a:t>
-            </a:r>
-            <a:r>
-              <a:rPr lang="en-US" dirty="0" smtClean="0"/>
-              <a:t> –Overview</a:t>
-            </a:r>
-            <a:endParaRPr lang="en-US" dirty="0"/>
-          </a:p>
-        </p:txBody>
-      </p:sp>
-      <p:sp>
-        <p:nvSpPr>
-          <p:cNvPr id="3" name="Content Placeholder 2"/>
-          <p:cNvSpPr>
-            <a:spLocks noGrp="1"/>
-          </p:cNvSpPr>
-          <p:nvPr>
-            <p:ph idx="1"/>
-          </p:nvPr>
-        </p:nvSpPr>
-        <p:spPr/>
-        <p:txBody>
-          <a:bodyPr/>
-          <a:lstStyle/>
-          <a:p>
-            <a:r>
-              <a:rPr lang="en-US" dirty="0" smtClean="0"/>
-              <a:t>Base consists of tasks, which are basically tiny modules written in python</a:t>
-            </a:r>
-          </a:p>
-          <a:p>
-            <a:r>
-              <a:rPr lang="en-US" dirty="0" smtClean="0"/>
-              <a:t>Tasks combined into roles and playbooks</a:t>
-            </a:r>
-          </a:p>
-        </p:txBody>
-      </p:sp>
-    </p:spTree>
-    <p:extLst>
-      <p:ext uri="{BB962C8B-B14F-4D97-AF65-F5344CB8AC3E}">
-        <p14:creationId xmlns:p14="http://schemas.microsoft.com/office/powerpoint/2010/main" val="571069763"/>
-      </p:ext>
-    </p:extLst>
-  </p:cSld>
-  <p:clrMapOvr>
-    <a:masterClrMapping/>
-  </p:clrMapOvr>
-</p:sld>
-</file>
-
 <file path=ppt/slides/slide6.xml><?xml version="1.0" encoding="utf-8"?>
 <p:sld xmlns:a="http://schemas.openxmlformats.org/drawingml/2006/main" xmlns:r="http://schemas.openxmlformats.org/officeDocument/2006/relationships" xmlns:p="http://schemas.openxmlformats.org/presentationml/2006/main">
   <p:cSld>
@@ -6958,7 +7392,7 @@
             </a:r>
             <a:r>
               <a:rPr lang="en-US" dirty="0" smtClean="0"/>
-              <a:t> – Benefits</a:t>
+              <a:t> –Overview</a:t>
             </a:r>
             <a:endParaRPr lang="en-US" dirty="0"/>
           </a:p>
@@ -6981,61 +7415,21 @@
           <a:p>
             <a:r>
               <a:rPr lang="en-US" dirty="0" smtClean="0"/>
-              <a:t>Run over multiple servers simultaneously</a:t>
-            </a:r>
-          </a:p>
-          <a:p>
-            <a:r>
-              <a:rPr lang="en-US" dirty="0" smtClean="0"/>
-              <a:t>No installation on remote machines because uses </a:t>
-            </a:r>
-            <a:r>
-              <a:rPr lang="en-US" dirty="0" err="1" smtClean="0"/>
-              <a:t>ssh</a:t>
-            </a:r>
-            <a:endParaRPr lang="en-US" dirty="0" smtClean="0"/>
-          </a:p>
-          <a:p>
-            <a:r>
-              <a:rPr lang="en-US" dirty="0" smtClean="0"/>
-              <a:t>Expression of state</a:t>
-            </a:r>
-          </a:p>
-          <a:p>
-            <a:pPr lvl="1"/>
-            <a:r>
-              <a:rPr lang="en-US" dirty="0" smtClean="0"/>
-              <a:t>Not “hey server do this”</a:t>
-            </a:r>
-          </a:p>
-          <a:p>
-            <a:pPr lvl="1"/>
-            <a:r>
-              <a:rPr lang="en-US" dirty="0" smtClean="0"/>
-              <a:t>Yes “hey server you should be like this”</a:t>
-            </a:r>
-          </a:p>
-          <a:p>
-            <a:pPr lvl="1"/>
-            <a:r>
-              <a:rPr lang="en-US" dirty="0" smtClean="0"/>
-              <a:t>Easier to reason about</a:t>
-            </a:r>
-          </a:p>
-          <a:p>
-            <a:pPr lvl="1"/>
-            <a:r>
-              <a:rPr lang="en-US" dirty="0" smtClean="0"/>
-              <a:t>Idempotent</a:t>
-            </a:r>
-            <a:endParaRPr lang="en-US" dirty="0"/>
+              <a:t>Base consists of tasks, which are basically tiny modules written in python</a:t>
+            </a:r>
+          </a:p>
+          <a:p>
+            <a:r>
+              <a:rPr lang="en-US" dirty="0" smtClean="0"/>
+              <a:t>Tasks combined into roles and playbooks</a:t>
+            </a:r>
           </a:p>
         </p:txBody>
       </p:sp>
     </p:spTree>
     <p:extLst>
       <p:ext uri="{BB962C8B-B14F-4D97-AF65-F5344CB8AC3E}">
-        <p14:creationId xmlns:p14="http://schemas.microsoft.com/office/powerpoint/2010/main" val="2633473099"/>
+        <p14:creationId xmlns:p14="http://schemas.microsoft.com/office/powerpoint/2010/main" val="571069763"/>
       </p:ext>
     </p:extLst>
   </p:cSld>
@@ -7079,11 +7473,11 @@
           <a:p>
             <a:r>
               <a:rPr lang="en-US" dirty="0" err="1" smtClean="0"/>
-              <a:t>Docker</a:t>
-            </a:r>
-            <a:r>
-              <a:rPr lang="en-US" dirty="0" smtClean="0"/>
-              <a:t> – Overview</a:t>
+              <a:t>Ansible</a:t>
+            </a:r>
+            <a:r>
+              <a:rPr lang="en-US" dirty="0" smtClean="0"/>
+              <a:t> – Benefits</a:t>
             </a:r>
             <a:endParaRPr lang="en-US" dirty="0"/>
           </a:p>
@@ -7106,31 +7500,52 @@
           <a:p>
             <a:r>
               <a:rPr lang="en-US" dirty="0" smtClean="0"/>
-              <a:t>Linux based containerization platform</a:t>
-            </a:r>
-          </a:p>
-          <a:p>
-            <a:r>
-              <a:rPr lang="en-US" dirty="0" smtClean="0"/>
-              <a:t>Creates separate “Containers” on same host</a:t>
-            </a:r>
-          </a:p>
-          <a:p>
-            <a:r>
-              <a:rPr lang="en-US" dirty="0" smtClean="0"/>
-              <a:t>Each container has isolated file system, network stack, environment variables, etc.</a:t>
-            </a:r>
-          </a:p>
-          <a:p>
-            <a:r>
-              <a:rPr lang="en-US" dirty="0" smtClean="0"/>
-              <a:t>Only shares host kernel</a:t>
-            </a:r>
-          </a:p>
-          <a:p>
-            <a:r>
-              <a:rPr lang="en-US" dirty="0" smtClean="0"/>
-              <a:t>Can cram a ton of apps on one host without worrying about apps affecting each other</a:t>
+              <a:t>Run over multiple servers simultaneously</a:t>
+            </a:r>
+          </a:p>
+          <a:p>
+            <a:r>
+              <a:rPr lang="en-US" dirty="0" smtClean="0"/>
+              <a:t>No installation on remote machines because uses </a:t>
+            </a:r>
+            <a:r>
+              <a:rPr lang="en-US" dirty="0" err="1" smtClean="0"/>
+              <a:t>ssh</a:t>
+            </a:r>
+            <a:endParaRPr lang="en-US" dirty="0" smtClean="0"/>
+          </a:p>
+          <a:p>
+            <a:r>
+              <a:rPr lang="en-US" dirty="0" smtClean="0"/>
+              <a:t>Expression of state</a:t>
+            </a:r>
+          </a:p>
+          <a:p>
+            <a:pPr lvl="1"/>
+            <a:r>
+              <a:rPr lang="en-US" dirty="0" smtClean="0"/>
+              <a:t>Not “hey server do this”</a:t>
+            </a:r>
+          </a:p>
+          <a:p>
+            <a:pPr lvl="1"/>
+            <a:r>
+              <a:rPr lang="en-US" dirty="0" smtClean="0"/>
+              <a:t>Yes “hey server you should be like this”</a:t>
+            </a:r>
+          </a:p>
+          <a:p>
+            <a:pPr lvl="1"/>
+            <a:r>
+              <a:rPr lang="en-US" dirty="0" smtClean="0"/>
+              <a:t>Easier to reason about</a:t>
+            </a:r>
+          </a:p>
+          <a:p>
+            <a:pPr lvl="1"/>
+            <a:r>
+              <a:rPr lang="en-US" dirty="0" smtClean="0"/>
+              <a:t>Idempotent</a:t>
             </a:r>
             <a:endParaRPr lang="en-US" dirty="0"/>
           </a:p>
@@ -7139,7 +7554,7 @@
     </p:spTree>
     <p:extLst>
       <p:ext uri="{BB962C8B-B14F-4D97-AF65-F5344CB8AC3E}">
-        <p14:creationId xmlns:p14="http://schemas.microsoft.com/office/powerpoint/2010/main" val="1947335422"/>
+        <p14:creationId xmlns:p14="http://schemas.microsoft.com/office/powerpoint/2010/main" val="2633473099"/>
       </p:ext>
     </p:extLst>
   </p:cSld>
@@ -7210,22 +7625,46 @@
           <a:p>
             <a:r>
               <a:rPr lang="en-US" dirty="0" smtClean="0"/>
+              <a:t>Linux based containerization platform</a:t>
+            </a:r>
+          </a:p>
+          <a:p>
+            <a:r>
+              <a:rPr lang="en-US" dirty="0" smtClean="0"/>
+              <a:t>Creates separate “Containers” on same host</a:t>
+            </a:r>
+          </a:p>
+          <a:p>
+            <a:r>
+              <a:rPr lang="en-US" dirty="0" smtClean="0"/>
+              <a:t>Each container has isolated file system, network stack, environment variables, etc.</a:t>
+            </a:r>
+          </a:p>
+          <a:p>
+            <a:r>
+              <a:rPr lang="en-US" dirty="0" smtClean="0"/>
+              <a:t>Only shares host </a:t>
+            </a:r>
+            <a:r>
+              <a:rPr lang="en-US" dirty="0" smtClean="0"/>
+              <a:t>kernel</a:t>
+            </a:r>
+          </a:p>
+          <a:p>
+            <a:r>
+              <a:rPr lang="en-US" dirty="0"/>
               <a:t>Designed to run a single process or set of related processes in isolated environment</a:t>
             </a:r>
           </a:p>
           <a:p>
-            <a:r>
-              <a:rPr lang="en-US" dirty="0" smtClean="0"/>
-              <a:t>Can move containers between machines, and be assured of consistent behavior, regardless of state of the underlying host</a:t>
-            </a:r>
-            <a:endParaRPr lang="en-US" dirty="0"/>
+            <a:endParaRPr lang="en-US" dirty="0" smtClean="0"/>
           </a:p>
         </p:txBody>
       </p:sp>
     </p:spTree>
     <p:extLst>
       <p:ext uri="{BB962C8B-B14F-4D97-AF65-F5344CB8AC3E}">
-        <p14:creationId xmlns:p14="http://schemas.microsoft.com/office/powerpoint/2010/main" val="2089330260"/>
+        <p14:creationId xmlns:p14="http://schemas.microsoft.com/office/powerpoint/2010/main" val="1947335422"/>
       </p:ext>
     </p:extLst>
   </p:cSld>
@@ -7273,7 +7712,11 @@
             </a:r>
             <a:r>
               <a:rPr lang="en-US" dirty="0" smtClean="0"/>
-              <a:t> – Benefits</a:t>
+              <a:t> – </a:t>
+            </a:r>
+            <a:r>
+              <a:rPr lang="en-US" dirty="0" smtClean="0"/>
+              <a:t>Overview: Networking</a:t>
             </a:r>
             <a:endParaRPr lang="en-US" dirty="0"/>
           </a:p>
@@ -7291,48 +7734,31 @@
         </p:nvSpPr>
         <p:spPr/>
         <p:txBody>
-          <a:bodyPr>
-            <a:normAutofit lnSpcReduction="10000"/>
-          </a:bodyPr>
-          <a:lstStyle/>
-          <a:p>
-            <a:r>
-              <a:rPr lang="en-US" dirty="0" smtClean="0"/>
-              <a:t>Cram more applications on a single server</a:t>
-            </a:r>
-          </a:p>
-          <a:p>
-            <a:pPr lvl="1"/>
-            <a:r>
-              <a:rPr lang="en-US" dirty="0" smtClean="0"/>
-              <a:t>Lighter weight than VMs</a:t>
-            </a:r>
-          </a:p>
-          <a:p>
-            <a:r>
-              <a:rPr lang="en-US" dirty="0" smtClean="0"/>
-              <a:t>Can write a container once and move from </a:t>
-            </a:r>
-            <a:r>
-              <a:rPr lang="en-US" dirty="0" err="1" smtClean="0"/>
-              <a:t>dev</a:t>
-            </a:r>
-            <a:r>
-              <a:rPr lang="en-US" dirty="0" smtClean="0"/>
-              <a:t>, test, prod reliably</a:t>
-            </a:r>
-          </a:p>
-          <a:p>
-            <a:r>
-              <a:rPr lang="en-US" dirty="0" smtClean="0"/>
-              <a:t>Lots of third party created containers/images of common software, easier to setup</a:t>
-            </a:r>
-          </a:p>
-          <a:p>
-            <a:r>
-              <a:rPr lang="en-US" dirty="0" smtClean="0"/>
-              <a:t>~0 downtime deployments, deploy new app as new container, swap with running container quickly</a:t>
-            </a:r>
+          <a:bodyPr/>
+          <a:lstStyle/>
+          <a:p>
+            <a:r>
+              <a:rPr lang="en-US" dirty="0" smtClean="0"/>
+              <a:t>Sets up a private network for intra-container communication on the host</a:t>
+            </a:r>
+          </a:p>
+          <a:p>
+            <a:r>
+              <a:rPr lang="en-US" dirty="0" smtClean="0"/>
+              <a:t>Each container gets a dedicated IP address</a:t>
+            </a:r>
+          </a:p>
+          <a:p>
+            <a:r>
+              <a:rPr lang="en-US" dirty="0" smtClean="0"/>
+              <a:t>Host can configure certain containers to be able to receive requests from outside network</a:t>
+            </a:r>
+            <a:endParaRPr lang="en-US" dirty="0" smtClean="0"/>
+          </a:p>
+          <a:p>
+            <a:endParaRPr lang="en-US" dirty="0" smtClean="0"/>
+          </a:p>
+          <a:p>
             <a:endParaRPr lang="en-US" dirty="0"/>
           </a:p>
         </p:txBody>
@@ -7340,7 +7766,7 @@
     </p:spTree>
     <p:extLst>
       <p:ext uri="{BB962C8B-B14F-4D97-AF65-F5344CB8AC3E}">
-        <p14:creationId xmlns:p14="http://schemas.microsoft.com/office/powerpoint/2010/main" val="3605668980"/>
+        <p14:creationId xmlns:p14="http://schemas.microsoft.com/office/powerpoint/2010/main" val="2089330260"/>
       </p:ext>
     </p:extLst>
   </p:cSld>

</xml_diff>

<commit_message>
fixing typos in deck
</commit_message>
<xml_diff>
--- a/slides.pptx
+++ b/slides.pptx
@@ -4626,6 +4626,13 @@
   <p:clrMapOvr>
     <a:masterClrMapping/>
   </p:clrMapOvr>
+  <p:timing>
+    <p:tnLst>
+      <p:par>
+        <p:cTn xmlns:p14="http://schemas.microsoft.com/office/powerpoint/2010/main" id="1" dur="indefinite" restart="never" nodeType="tmRoot"/>
+      </p:par>
+    </p:tnLst>
+  </p:timing>
 </p:sld>
 </file>
 
@@ -4741,6 +4748,13 @@
   <p:clrMapOvr>
     <a:masterClrMapping/>
   </p:clrMapOvr>
+  <p:timing>
+    <p:tnLst>
+      <p:par>
+        <p:cTn xmlns:p14="http://schemas.microsoft.com/office/powerpoint/2010/main" id="1" dur="indefinite" restart="never" nodeType="tmRoot"/>
+      </p:par>
+    </p:tnLst>
+  </p:timing>
 </p:sld>
 </file>
 
@@ -4850,6 +4864,13 @@
   <p:clrMapOvr>
     <a:masterClrMapping/>
   </p:clrMapOvr>
+  <p:timing>
+    <p:tnLst>
+      <p:par>
+        <p:cTn xmlns:p14="http://schemas.microsoft.com/office/powerpoint/2010/main" id="1" dur="indefinite" restart="never" nodeType="tmRoot"/>
+      </p:par>
+    </p:tnLst>
+  </p:timing>
 </p:sld>
 </file>
 
@@ -4978,6 +4999,13 @@
   <p:clrMapOvr>
     <a:masterClrMapping/>
   </p:clrMapOvr>
+  <p:timing>
+    <p:tnLst>
+      <p:par>
+        <p:cTn xmlns:p14="http://schemas.microsoft.com/office/powerpoint/2010/main" id="1" dur="indefinite" restart="never" nodeType="tmRoot"/>
+      </p:par>
+    </p:tnLst>
+  </p:timing>
 </p:sld>
 </file>
 
@@ -5025,11 +5053,11 @@
             </a:r>
             <a:r>
               <a:rPr lang="en-US" dirty="0" smtClean="0"/>
-              <a:t> Container: App </a:t>
-            </a:r>
-            <a:r>
-              <a:rPr lang="en-US" dirty="0" err="1" smtClean="0"/>
-              <a:t>Strucuture</a:t>
+              <a:t> Container: </a:t>
+            </a:r>
+            <a:r>
+              <a:rPr lang="en-US" smtClean="0"/>
+              <a:t>App Structure</a:t>
             </a:r>
             <a:endParaRPr lang="en-US" dirty="0"/>
           </a:p>
@@ -5116,6 +5144,13 @@
   <p:clrMapOvr>
     <a:masterClrMapping/>
   </p:clrMapOvr>
+  <p:timing>
+    <p:tnLst>
+      <p:par>
+        <p:cTn xmlns:p14="http://schemas.microsoft.com/office/powerpoint/2010/main" id="1" dur="indefinite" restart="never" nodeType="tmRoot"/>
+      </p:par>
+    </p:tnLst>
+  </p:timing>
 </p:sld>
 </file>
 
@@ -5260,6 +5295,13 @@
   <p:clrMapOvr>
     <a:masterClrMapping/>
   </p:clrMapOvr>
+  <p:timing>
+    <p:tnLst>
+      <p:par>
+        <p:cTn xmlns:p14="http://schemas.microsoft.com/office/powerpoint/2010/main" id="1" dur="indefinite" restart="never" nodeType="tmRoot"/>
+      </p:par>
+    </p:tnLst>
+  </p:timing>
 </p:sld>
 </file>
 
@@ -5395,6 +5437,13 @@
   <p:clrMapOvr>
     <a:masterClrMapping/>
   </p:clrMapOvr>
+  <p:timing>
+    <p:tnLst>
+      <p:par>
+        <p:cTn xmlns:p14="http://schemas.microsoft.com/office/powerpoint/2010/main" id="1" dur="indefinite" restart="never" nodeType="tmRoot"/>
+      </p:par>
+    </p:tnLst>
+  </p:timing>
 </p:sld>
 </file>
 
@@ -5512,6 +5561,13 @@
   <p:clrMapOvr>
     <a:masterClrMapping/>
   </p:clrMapOvr>
+  <p:timing>
+    <p:tnLst>
+      <p:par>
+        <p:cTn xmlns:p14="http://schemas.microsoft.com/office/powerpoint/2010/main" id="1" dur="indefinite" restart="never" nodeType="tmRoot"/>
+      </p:par>
+    </p:tnLst>
+  </p:timing>
 </p:sld>
 </file>
 
@@ -5669,6 +5725,13 @@
   <p:clrMapOvr>
     <a:masterClrMapping/>
   </p:clrMapOvr>
+  <p:timing>
+    <p:tnLst>
+      <p:par>
+        <p:cTn xmlns:p14="http://schemas.microsoft.com/office/powerpoint/2010/main" id="1" dur="indefinite" restart="never" nodeType="tmRoot"/>
+      </p:par>
+    </p:tnLst>
+  </p:timing>
 </p:sld>
 </file>
 
@@ -5804,6 +5867,13 @@
   <p:clrMapOvr>
     <a:masterClrMapping/>
   </p:clrMapOvr>
+  <p:timing>
+    <p:tnLst>
+      <p:par>
+        <p:cTn xmlns:p14="http://schemas.microsoft.com/office/powerpoint/2010/main" id="1" dur="indefinite" restart="never" nodeType="tmRoot"/>
+      </p:par>
+    </p:tnLst>
+  </p:timing>
 </p:sld>
 </file>
 
@@ -5916,6 +5986,13 @@
   <p:clrMapOvr>
     <a:masterClrMapping/>
   </p:clrMapOvr>
+  <p:timing>
+    <p:tnLst>
+      <p:par>
+        <p:cTn xmlns:p14="http://schemas.microsoft.com/office/powerpoint/2010/main" id="1" dur="indefinite" restart="never" nodeType="tmRoot"/>
+      </p:par>
+    </p:tnLst>
+  </p:timing>
 </p:sld>
 </file>
 
@@ -6021,6 +6098,13 @@
   <p:clrMapOvr>
     <a:masterClrMapping/>
   </p:clrMapOvr>
+  <p:timing>
+    <p:tnLst>
+      <p:par>
+        <p:cTn xmlns:p14="http://schemas.microsoft.com/office/powerpoint/2010/main" id="1" dur="indefinite" restart="never" nodeType="tmRoot"/>
+      </p:par>
+    </p:tnLst>
+  </p:timing>
 </p:sld>
 </file>
 
@@ -6180,6 +6264,13 @@
   <p:clrMapOvr>
     <a:masterClrMapping/>
   </p:clrMapOvr>
+  <p:timing>
+    <p:tnLst>
+      <p:par>
+        <p:cTn xmlns:p14="http://schemas.microsoft.com/office/powerpoint/2010/main" id="1" dur="indefinite" restart="never" nodeType="tmRoot"/>
+      </p:par>
+    </p:tnLst>
+  </p:timing>
 </p:sld>
 </file>
 
@@ -6379,6 +6470,13 @@
   <p:clrMapOvr>
     <a:masterClrMapping/>
   </p:clrMapOvr>
+  <p:timing>
+    <p:tnLst>
+      <p:par>
+        <p:cTn xmlns:p14="http://schemas.microsoft.com/office/powerpoint/2010/main" id="1" dur="indefinite" restart="never" nodeType="tmRoot"/>
+      </p:par>
+    </p:tnLst>
+  </p:timing>
 </p:sld>
 </file>
 
@@ -6529,6 +6627,13 @@
   <p:clrMapOvr>
     <a:masterClrMapping/>
   </p:clrMapOvr>
+  <p:timing>
+    <p:tnLst>
+      <p:par>
+        <p:cTn xmlns:p14="http://schemas.microsoft.com/office/powerpoint/2010/main" id="1" dur="indefinite" restart="never" nodeType="tmRoot"/>
+      </p:par>
+    </p:tnLst>
+  </p:timing>
 </p:sld>
 </file>
 
@@ -6674,6 +6779,13 @@
   <p:clrMapOvr>
     <a:masterClrMapping/>
   </p:clrMapOvr>
+  <p:timing>
+    <p:tnLst>
+      <p:par>
+        <p:cTn xmlns:p14="http://schemas.microsoft.com/office/powerpoint/2010/main" id="1" dur="indefinite" restart="never" nodeType="tmRoot"/>
+      </p:par>
+    </p:tnLst>
+  </p:timing>
 </p:sld>
 </file>
 
@@ -6848,6 +6960,13 @@
   <p:clrMapOvr>
     <a:masterClrMapping/>
   </p:clrMapOvr>
+  <p:timing>
+    <p:tnLst>
+      <p:par>
+        <p:cTn xmlns:p14="http://schemas.microsoft.com/office/powerpoint/2010/main" id="1" dur="indefinite" restart="never" nodeType="tmRoot"/>
+      </p:par>
+    </p:tnLst>
+  </p:timing>
 </p:sld>
 </file>
 
@@ -6920,6 +7039,13 @@
   <p:clrMapOvr>
     <a:masterClrMapping/>
   </p:clrMapOvr>
+  <p:timing>
+    <p:tnLst>
+      <p:par>
+        <p:cTn xmlns:p14="http://schemas.microsoft.com/office/powerpoint/2010/main" id="1" dur="indefinite" restart="never" nodeType="tmRoot"/>
+      </p:par>
+    </p:tnLst>
+  </p:timing>
 </p:sld>
 </file>
 
@@ -7028,6 +7154,13 @@
   <p:clrMapOvr>
     <a:masterClrMapping/>
   </p:clrMapOvr>
+  <p:timing>
+    <p:tnLst>
+      <p:par>
+        <p:cTn xmlns:p14="http://schemas.microsoft.com/office/powerpoint/2010/main" id="1" dur="indefinite" restart="never" nodeType="tmRoot"/>
+      </p:par>
+    </p:tnLst>
+  </p:timing>
 </p:sld>
 </file>
 
@@ -7230,6 +7363,13 @@
   <p:clrMapOvr>
     <a:masterClrMapping/>
   </p:clrMapOvr>
+  <p:timing>
+    <p:tnLst>
+      <p:par>
+        <p:cTn xmlns:p14="http://schemas.microsoft.com/office/powerpoint/2010/main" id="1" dur="indefinite" restart="never" nodeType="tmRoot"/>
+      </p:par>
+    </p:tnLst>
+  </p:timing>
 </p:sld>
 </file>
 
@@ -7351,6 +7491,13 @@
   <p:clrMapOvr>
     <a:masterClrMapping/>
   </p:clrMapOvr>
+  <p:timing>
+    <p:tnLst>
+      <p:par>
+        <p:cTn xmlns:p14="http://schemas.microsoft.com/office/powerpoint/2010/main" id="1" dur="indefinite" restart="never" nodeType="tmRoot"/>
+      </p:par>
+    </p:tnLst>
+  </p:timing>
 </p:sld>
 </file>
 
@@ -7436,6 +7583,13 @@
   <p:clrMapOvr>
     <a:masterClrMapping/>
   </p:clrMapOvr>
+  <p:timing>
+    <p:tnLst>
+      <p:par>
+        <p:cTn xmlns:p14="http://schemas.microsoft.com/office/powerpoint/2010/main" id="1" dur="indefinite" restart="never" nodeType="tmRoot"/>
+      </p:par>
+    </p:tnLst>
+  </p:timing>
 </p:sld>
 </file>
 
@@ -7561,6 +7715,13 @@
   <p:clrMapOvr>
     <a:masterClrMapping/>
   </p:clrMapOvr>
+  <p:timing>
+    <p:tnLst>
+      <p:par>
+        <p:cTn xmlns:p14="http://schemas.microsoft.com/office/powerpoint/2010/main" id="1" dur="indefinite" restart="never" nodeType="tmRoot"/>
+      </p:par>
+    </p:tnLst>
+  </p:timing>
 </p:sld>
 </file>
 
@@ -7671,6 +7832,13 @@
   <p:clrMapOvr>
     <a:masterClrMapping/>
   </p:clrMapOvr>
+  <p:timing>
+    <p:tnLst>
+      <p:par>
+        <p:cTn xmlns:p14="http://schemas.microsoft.com/office/powerpoint/2010/main" id="1" dur="indefinite" restart="never" nodeType="tmRoot"/>
+      </p:par>
+    </p:tnLst>
+  </p:timing>
 </p:sld>
 </file>
 
@@ -7773,6 +7941,13 @@
   <p:clrMapOvr>
     <a:masterClrMapping/>
   </p:clrMapOvr>
+  <p:timing>
+    <p:tnLst>
+      <p:par>
+        <p:cTn xmlns:p14="http://schemas.microsoft.com/office/powerpoint/2010/main" id="1" dur="indefinite" restart="never" nodeType="tmRoot"/>
+      </p:par>
+    </p:tnLst>
+  </p:timing>
 </p:sld>
 </file>
 

</xml_diff>